<commit_message>
Manual up to examples
</commit_message>
<xml_diff>
--- a/Docs/User's Guide/Imagery/ModelExecution.pptx
+++ b/Docs/User's Guide/Imagery/ModelExecution.pptx
@@ -6,6 +6,21 @@
   </p:sldMasterIdLst>
   <p:sldIdLst>
     <p:sldId id="256" r:id="rId2"/>
+    <p:sldId id="257" r:id="rId3"/>
+    <p:sldId id="258" r:id="rId4"/>
+    <p:sldId id="259" r:id="rId5"/>
+    <p:sldId id="260" r:id="rId6"/>
+    <p:sldId id="261" r:id="rId7"/>
+    <p:sldId id="262" r:id="rId8"/>
+    <p:sldId id="264" r:id="rId9"/>
+    <p:sldId id="265" r:id="rId10"/>
+    <p:sldId id="263" r:id="rId11"/>
+    <p:sldId id="266" r:id="rId12"/>
+    <p:sldId id="267" r:id="rId13"/>
+    <p:sldId id="268" r:id="rId14"/>
+    <p:sldId id="269" r:id="rId15"/>
+    <p:sldId id="271" r:id="rId16"/>
+    <p:sldId id="270" r:id="rId17"/>
   </p:sldIdLst>
   <p:sldSz cx="12192000" cy="6858000"/>
   <p:notesSz cx="6858000" cy="9144000"/>
@@ -104,6 +119,11 @@
       </a:defRPr>
     </a:lvl9pPr>
   </p:defaultTextStyle>
+  <p:extLst>
+    <p:ext uri="{EFAFB233-063F-42B5-8137-9DF3F51BA10A}">
+      <p15:sldGuideLst xmlns:p15="http://schemas.microsoft.com/office/powerpoint/2012/main"/>
+    </p:ext>
+  </p:extLst>
 </p:presentation>
 </file>
 
@@ -3415,6 +3435,2574 @@
 </p:sld>
 </file>
 
+<file path=ppt/slides/slide10.xml><?xml version="1.0" encoding="utf-8"?>
+<p:sld xmlns:a="http://schemas.openxmlformats.org/drawingml/2006/main" xmlns:r="http://schemas.openxmlformats.org/officeDocument/2006/relationships" xmlns:p="http://schemas.openxmlformats.org/presentationml/2006/main">
+  <p:cSld>
+    <p:spTree>
+      <p:nvGrpSpPr>
+        <p:cNvPr id="1" name=""/>
+        <p:cNvGrpSpPr/>
+        <p:nvPr/>
+      </p:nvGrpSpPr>
+      <p:grpSpPr>
+        <a:xfrm>
+          <a:off x="0" y="0"/>
+          <a:ext cx="0" cy="0"/>
+          <a:chOff x="0" y="0"/>
+          <a:chExt cx="0" cy="0"/>
+        </a:xfrm>
+      </p:grpSpPr>
+      <p:pic>
+        <p:nvPicPr>
+          <p:cNvPr id="5" name="Picture 4">
+            <a:extLst>
+              <a:ext uri="{FF2B5EF4-FFF2-40B4-BE49-F238E27FC236}">
+                <a16:creationId xmlns:a16="http://schemas.microsoft.com/office/drawing/2014/main" id="{25D1639D-D887-D62B-182A-5E492284110B}"/>
+              </a:ext>
+            </a:extLst>
+          </p:cNvPr>
+          <p:cNvPicPr>
+            <a:picLocks noChangeAspect="1"/>
+          </p:cNvPicPr>
+          <p:nvPr/>
+        </p:nvPicPr>
+        <p:blipFill>
+          <a:blip r:embed="rId2"/>
+          <a:stretch>
+            <a:fillRect/>
+          </a:stretch>
+        </p:blipFill>
+        <p:spPr>
+          <a:xfrm>
+            <a:off x="0" y="0"/>
+            <a:ext cx="12192000" cy="6858000"/>
+          </a:xfrm>
+          <a:prstGeom prst="rect">
+            <a:avLst/>
+          </a:prstGeom>
+        </p:spPr>
+      </p:pic>
+    </p:spTree>
+    <p:extLst>
+      <p:ext uri="{BB962C8B-B14F-4D97-AF65-F5344CB8AC3E}">
+        <p14:creationId xmlns:p14="http://schemas.microsoft.com/office/powerpoint/2010/main" val="1234231220"/>
+      </p:ext>
+    </p:extLst>
+  </p:cSld>
+  <p:clrMapOvr>
+    <a:masterClrMapping/>
+  </p:clrMapOvr>
+</p:sld>
+</file>
+
+<file path=ppt/slides/slide11.xml><?xml version="1.0" encoding="utf-8"?>
+<p:sld xmlns:a="http://schemas.openxmlformats.org/drawingml/2006/main" xmlns:r="http://schemas.openxmlformats.org/officeDocument/2006/relationships" xmlns:p="http://schemas.openxmlformats.org/presentationml/2006/main">
+  <p:cSld>
+    <p:spTree>
+      <p:nvGrpSpPr>
+        <p:cNvPr id="1" name=""/>
+        <p:cNvGrpSpPr/>
+        <p:nvPr/>
+      </p:nvGrpSpPr>
+      <p:grpSpPr>
+        <a:xfrm>
+          <a:off x="0" y="0"/>
+          <a:ext cx="0" cy="0"/>
+          <a:chOff x="0" y="0"/>
+          <a:chExt cx="0" cy="0"/>
+        </a:xfrm>
+      </p:grpSpPr>
+      <p:pic>
+        <p:nvPicPr>
+          <p:cNvPr id="3" name="Picture 2">
+            <a:extLst>
+              <a:ext uri="{FF2B5EF4-FFF2-40B4-BE49-F238E27FC236}">
+                <a16:creationId xmlns:a16="http://schemas.microsoft.com/office/drawing/2014/main" id="{5CE5810A-5C3B-14CC-B1DF-D10606E6EEC2}"/>
+              </a:ext>
+            </a:extLst>
+          </p:cNvPr>
+          <p:cNvPicPr>
+            <a:picLocks noChangeAspect="1"/>
+          </p:cNvPicPr>
+          <p:nvPr/>
+        </p:nvPicPr>
+        <p:blipFill>
+          <a:blip r:embed="rId2"/>
+          <a:stretch>
+            <a:fillRect/>
+          </a:stretch>
+        </p:blipFill>
+        <p:spPr>
+          <a:xfrm>
+            <a:off x="1417570" y="914049"/>
+            <a:ext cx="6030167" cy="5029902"/>
+          </a:xfrm>
+          <a:prstGeom prst="rect">
+            <a:avLst/>
+          </a:prstGeom>
+        </p:spPr>
+      </p:pic>
+      <p:sp>
+        <p:nvSpPr>
+          <p:cNvPr id="4" name="Oval 3">
+            <a:extLst>
+              <a:ext uri="{FF2B5EF4-FFF2-40B4-BE49-F238E27FC236}">
+                <a16:creationId xmlns:a16="http://schemas.microsoft.com/office/drawing/2014/main" id="{A2BEC250-7526-E06C-AA51-590E6A932540}"/>
+              </a:ext>
+            </a:extLst>
+          </p:cNvPr>
+          <p:cNvSpPr/>
+          <p:nvPr/>
+        </p:nvSpPr>
+        <p:spPr>
+          <a:xfrm>
+            <a:off x="1349830" y="1367244"/>
+            <a:ext cx="2394848" cy="280866"/>
+          </a:xfrm>
+          <a:prstGeom prst="ellipse">
+            <a:avLst/>
+          </a:prstGeom>
+          <a:noFill/>
+          <a:ln w="47625">
+            <a:solidFill>
+              <a:schemeClr val="accent2"/>
+            </a:solidFill>
+          </a:ln>
+        </p:spPr>
+        <p:style>
+          <a:lnRef idx="2">
+            <a:schemeClr val="accent1">
+              <a:shade val="15000"/>
+            </a:schemeClr>
+          </a:lnRef>
+          <a:fillRef idx="1">
+            <a:schemeClr val="accent1"/>
+          </a:fillRef>
+          <a:effectRef idx="0">
+            <a:schemeClr val="accent1"/>
+          </a:effectRef>
+          <a:fontRef idx="minor">
+            <a:schemeClr val="lt1"/>
+          </a:fontRef>
+        </p:style>
+        <p:txBody>
+          <a:bodyPr rtlCol="0" anchor="ctr"/>
+          <a:lstStyle/>
+          <a:p>
+            <a:pPr algn="ctr"/>
+            <a:endParaRPr lang="en-CA"/>
+          </a:p>
+        </p:txBody>
+      </p:sp>
+      <p:pic>
+        <p:nvPicPr>
+          <p:cNvPr id="6" name="Picture 5">
+            <a:extLst>
+              <a:ext uri="{FF2B5EF4-FFF2-40B4-BE49-F238E27FC236}">
+                <a16:creationId xmlns:a16="http://schemas.microsoft.com/office/drawing/2014/main" id="{AAE4EE6C-0D9E-A9F5-F328-78E6E3BCFF11}"/>
+              </a:ext>
+            </a:extLst>
+          </p:cNvPr>
+          <p:cNvPicPr>
+            <a:picLocks noChangeAspect="1"/>
+          </p:cNvPicPr>
+          <p:nvPr/>
+        </p:nvPicPr>
+        <p:blipFill>
+          <a:blip r:embed="rId3"/>
+          <a:stretch>
+            <a:fillRect/>
+          </a:stretch>
+        </p:blipFill>
+        <p:spPr>
+          <a:xfrm>
+            <a:off x="7611179" y="1018839"/>
+            <a:ext cx="3553321" cy="4925112"/>
+          </a:xfrm>
+          <a:prstGeom prst="rect">
+            <a:avLst/>
+          </a:prstGeom>
+        </p:spPr>
+      </p:pic>
+      <p:sp>
+        <p:nvSpPr>
+          <p:cNvPr id="7" name="Oval 6">
+            <a:extLst>
+              <a:ext uri="{FF2B5EF4-FFF2-40B4-BE49-F238E27FC236}">
+                <a16:creationId xmlns:a16="http://schemas.microsoft.com/office/drawing/2014/main" id="{0A448D00-C2C6-742F-872C-EEDB311D1F08}"/>
+              </a:ext>
+            </a:extLst>
+          </p:cNvPr>
+          <p:cNvSpPr/>
+          <p:nvPr/>
+        </p:nvSpPr>
+        <p:spPr>
+          <a:xfrm>
+            <a:off x="3988526" y="1624152"/>
+            <a:ext cx="679268" cy="280866"/>
+          </a:xfrm>
+          <a:prstGeom prst="ellipse">
+            <a:avLst/>
+          </a:prstGeom>
+          <a:noFill/>
+          <a:ln w="47625">
+            <a:solidFill>
+              <a:schemeClr val="accent2"/>
+            </a:solidFill>
+          </a:ln>
+        </p:spPr>
+        <p:style>
+          <a:lnRef idx="2">
+            <a:schemeClr val="accent1">
+              <a:shade val="15000"/>
+            </a:schemeClr>
+          </a:lnRef>
+          <a:fillRef idx="1">
+            <a:schemeClr val="accent1"/>
+          </a:fillRef>
+          <a:effectRef idx="0">
+            <a:schemeClr val="accent1"/>
+          </a:effectRef>
+          <a:fontRef idx="minor">
+            <a:schemeClr val="lt1"/>
+          </a:fontRef>
+        </p:style>
+        <p:txBody>
+          <a:bodyPr rtlCol="0" anchor="ctr"/>
+          <a:lstStyle/>
+          <a:p>
+            <a:pPr algn="ctr"/>
+            <a:endParaRPr lang="en-CA"/>
+          </a:p>
+        </p:txBody>
+      </p:sp>
+      <p:sp>
+        <p:nvSpPr>
+          <p:cNvPr id="8" name="Oval 7">
+            <a:extLst>
+              <a:ext uri="{FF2B5EF4-FFF2-40B4-BE49-F238E27FC236}">
+                <a16:creationId xmlns:a16="http://schemas.microsoft.com/office/drawing/2014/main" id="{AFAB501A-36E8-D157-4868-335A6DE66781}"/>
+              </a:ext>
+            </a:extLst>
+          </p:cNvPr>
+          <p:cNvSpPr/>
+          <p:nvPr/>
+        </p:nvSpPr>
+        <p:spPr>
+          <a:xfrm>
+            <a:off x="8355875" y="1624152"/>
+            <a:ext cx="679268" cy="280866"/>
+          </a:xfrm>
+          <a:prstGeom prst="ellipse">
+            <a:avLst/>
+          </a:prstGeom>
+          <a:noFill/>
+          <a:ln w="47625">
+            <a:solidFill>
+              <a:schemeClr val="accent2"/>
+            </a:solidFill>
+          </a:ln>
+        </p:spPr>
+        <p:style>
+          <a:lnRef idx="2">
+            <a:schemeClr val="accent1">
+              <a:shade val="15000"/>
+            </a:schemeClr>
+          </a:lnRef>
+          <a:fillRef idx="1">
+            <a:schemeClr val="accent1"/>
+          </a:fillRef>
+          <a:effectRef idx="0">
+            <a:schemeClr val="accent1"/>
+          </a:effectRef>
+          <a:fontRef idx="minor">
+            <a:schemeClr val="lt1"/>
+          </a:fontRef>
+        </p:style>
+        <p:txBody>
+          <a:bodyPr rtlCol="0" anchor="ctr"/>
+          <a:lstStyle/>
+          <a:p>
+            <a:pPr algn="ctr"/>
+            <a:endParaRPr lang="en-CA"/>
+          </a:p>
+        </p:txBody>
+      </p:sp>
+    </p:spTree>
+    <p:extLst>
+      <p:ext uri="{BB962C8B-B14F-4D97-AF65-F5344CB8AC3E}">
+        <p14:creationId xmlns:p14="http://schemas.microsoft.com/office/powerpoint/2010/main" val="3888633222"/>
+      </p:ext>
+    </p:extLst>
+  </p:cSld>
+  <p:clrMapOvr>
+    <a:masterClrMapping/>
+  </p:clrMapOvr>
+</p:sld>
+</file>
+
+<file path=ppt/slides/slide12.xml><?xml version="1.0" encoding="utf-8"?>
+<p:sld xmlns:a="http://schemas.openxmlformats.org/drawingml/2006/main" xmlns:r="http://schemas.openxmlformats.org/officeDocument/2006/relationships" xmlns:p="http://schemas.openxmlformats.org/presentationml/2006/main">
+  <p:cSld>
+    <p:spTree>
+      <p:nvGrpSpPr>
+        <p:cNvPr id="1" name=""/>
+        <p:cNvGrpSpPr/>
+        <p:nvPr/>
+      </p:nvGrpSpPr>
+      <p:grpSpPr>
+        <a:xfrm>
+          <a:off x="0" y="0"/>
+          <a:ext cx="0" cy="0"/>
+          <a:chOff x="0" y="0"/>
+          <a:chExt cx="0" cy="0"/>
+        </a:xfrm>
+      </p:grpSpPr>
+      <p:pic>
+        <p:nvPicPr>
+          <p:cNvPr id="3" name="Picture 2">
+            <a:extLst>
+              <a:ext uri="{FF2B5EF4-FFF2-40B4-BE49-F238E27FC236}">
+                <a16:creationId xmlns:a16="http://schemas.microsoft.com/office/drawing/2014/main" id="{5780FC9A-D6E2-F99F-7C95-01F0B50D3B89}"/>
+              </a:ext>
+            </a:extLst>
+          </p:cNvPr>
+          <p:cNvPicPr>
+            <a:picLocks noChangeAspect="1"/>
+          </p:cNvPicPr>
+          <p:nvPr/>
+        </p:nvPicPr>
+        <p:blipFill>
+          <a:blip r:embed="rId2"/>
+          <a:stretch>
+            <a:fillRect/>
+          </a:stretch>
+        </p:blipFill>
+        <p:spPr>
+          <a:xfrm>
+            <a:off x="1036319" y="1096290"/>
+            <a:ext cx="2843583" cy="2649702"/>
+          </a:xfrm>
+          <a:prstGeom prst="rect">
+            <a:avLst/>
+          </a:prstGeom>
+        </p:spPr>
+      </p:pic>
+      <p:pic>
+        <p:nvPicPr>
+          <p:cNvPr id="5" name="Picture 4">
+            <a:extLst>
+              <a:ext uri="{FF2B5EF4-FFF2-40B4-BE49-F238E27FC236}">
+                <a16:creationId xmlns:a16="http://schemas.microsoft.com/office/drawing/2014/main" id="{507621AD-F317-6B2F-6DA9-0537B2CA9D06}"/>
+              </a:ext>
+            </a:extLst>
+          </p:cNvPr>
+          <p:cNvPicPr>
+            <a:picLocks noChangeAspect="1"/>
+          </p:cNvPicPr>
+          <p:nvPr/>
+        </p:nvPicPr>
+        <p:blipFill>
+          <a:blip r:embed="rId3"/>
+          <a:stretch>
+            <a:fillRect/>
+          </a:stretch>
+        </p:blipFill>
+        <p:spPr>
+          <a:xfrm>
+            <a:off x="8406218" y="1103288"/>
+            <a:ext cx="3449460" cy="4669292"/>
+          </a:xfrm>
+          <a:prstGeom prst="rect">
+            <a:avLst/>
+          </a:prstGeom>
+        </p:spPr>
+      </p:pic>
+      <p:pic>
+        <p:nvPicPr>
+          <p:cNvPr id="7" name="Picture 6">
+            <a:extLst>
+              <a:ext uri="{FF2B5EF4-FFF2-40B4-BE49-F238E27FC236}">
+                <a16:creationId xmlns:a16="http://schemas.microsoft.com/office/drawing/2014/main" id="{B00A76C3-3DE1-8C80-1D42-BC6854106671}"/>
+              </a:ext>
+            </a:extLst>
+          </p:cNvPr>
+          <p:cNvPicPr>
+            <a:picLocks noChangeAspect="1"/>
+          </p:cNvPicPr>
+          <p:nvPr/>
+        </p:nvPicPr>
+        <p:blipFill>
+          <a:blip r:embed="rId4"/>
+          <a:stretch>
+            <a:fillRect/>
+          </a:stretch>
+        </p:blipFill>
+        <p:spPr>
+          <a:xfrm>
+            <a:off x="3974020" y="1103288"/>
+            <a:ext cx="4338080" cy="3691811"/>
+          </a:xfrm>
+          <a:prstGeom prst="rect">
+            <a:avLst/>
+          </a:prstGeom>
+        </p:spPr>
+      </p:pic>
+      <p:sp>
+        <p:nvSpPr>
+          <p:cNvPr id="8" name="Oval 7">
+            <a:extLst>
+              <a:ext uri="{FF2B5EF4-FFF2-40B4-BE49-F238E27FC236}">
+                <a16:creationId xmlns:a16="http://schemas.microsoft.com/office/drawing/2014/main" id="{AF179441-0185-10EA-F971-6088EB246650}"/>
+              </a:ext>
+            </a:extLst>
+          </p:cNvPr>
+          <p:cNvSpPr/>
+          <p:nvPr/>
+        </p:nvSpPr>
+        <p:spPr>
+          <a:xfrm>
+            <a:off x="2438396" y="1297572"/>
+            <a:ext cx="1201774" cy="280866"/>
+          </a:xfrm>
+          <a:prstGeom prst="ellipse">
+            <a:avLst/>
+          </a:prstGeom>
+          <a:noFill/>
+          <a:ln w="47625">
+            <a:solidFill>
+              <a:schemeClr val="accent2"/>
+            </a:solidFill>
+          </a:ln>
+        </p:spPr>
+        <p:style>
+          <a:lnRef idx="2">
+            <a:schemeClr val="accent1">
+              <a:shade val="15000"/>
+            </a:schemeClr>
+          </a:lnRef>
+          <a:fillRef idx="1">
+            <a:schemeClr val="accent1"/>
+          </a:fillRef>
+          <a:effectRef idx="0">
+            <a:schemeClr val="accent1"/>
+          </a:effectRef>
+          <a:fontRef idx="minor">
+            <a:schemeClr val="lt1"/>
+          </a:fontRef>
+        </p:style>
+        <p:txBody>
+          <a:bodyPr rtlCol="0" anchor="ctr"/>
+          <a:lstStyle/>
+          <a:p>
+            <a:pPr algn="ctr"/>
+            <a:endParaRPr lang="en-CA"/>
+          </a:p>
+        </p:txBody>
+      </p:sp>
+      <p:sp>
+        <p:nvSpPr>
+          <p:cNvPr id="9" name="Oval 8">
+            <a:extLst>
+              <a:ext uri="{FF2B5EF4-FFF2-40B4-BE49-F238E27FC236}">
+                <a16:creationId xmlns:a16="http://schemas.microsoft.com/office/drawing/2014/main" id="{E0ED7B93-B013-EC74-9A81-C5B72EEFF6C3}"/>
+              </a:ext>
+            </a:extLst>
+          </p:cNvPr>
+          <p:cNvSpPr/>
+          <p:nvPr/>
+        </p:nvSpPr>
+        <p:spPr>
+          <a:xfrm>
+            <a:off x="3974020" y="1550127"/>
+            <a:ext cx="2121980" cy="339654"/>
+          </a:xfrm>
+          <a:prstGeom prst="ellipse">
+            <a:avLst/>
+          </a:prstGeom>
+          <a:noFill/>
+          <a:ln w="47625">
+            <a:solidFill>
+              <a:schemeClr val="accent2"/>
+            </a:solidFill>
+          </a:ln>
+        </p:spPr>
+        <p:style>
+          <a:lnRef idx="2">
+            <a:schemeClr val="accent1">
+              <a:shade val="15000"/>
+            </a:schemeClr>
+          </a:lnRef>
+          <a:fillRef idx="1">
+            <a:schemeClr val="accent1"/>
+          </a:fillRef>
+          <a:effectRef idx="0">
+            <a:schemeClr val="accent1"/>
+          </a:effectRef>
+          <a:fontRef idx="minor">
+            <a:schemeClr val="lt1"/>
+          </a:fontRef>
+        </p:style>
+        <p:txBody>
+          <a:bodyPr rtlCol="0" anchor="ctr"/>
+          <a:lstStyle/>
+          <a:p>
+            <a:pPr algn="ctr"/>
+            <a:endParaRPr lang="en-CA"/>
+          </a:p>
+        </p:txBody>
+      </p:sp>
+      <p:sp>
+        <p:nvSpPr>
+          <p:cNvPr id="10" name="Oval 9">
+            <a:extLst>
+              <a:ext uri="{FF2B5EF4-FFF2-40B4-BE49-F238E27FC236}">
+                <a16:creationId xmlns:a16="http://schemas.microsoft.com/office/drawing/2014/main" id="{2E9DE1DC-061D-7A38-ABDF-2A6A74B2F210}"/>
+              </a:ext>
+            </a:extLst>
+          </p:cNvPr>
+          <p:cNvSpPr/>
+          <p:nvPr/>
+        </p:nvSpPr>
+        <p:spPr>
+          <a:xfrm>
+            <a:off x="3879901" y="2322561"/>
+            <a:ext cx="1066567" cy="339654"/>
+          </a:xfrm>
+          <a:prstGeom prst="ellipse">
+            <a:avLst/>
+          </a:prstGeom>
+          <a:noFill/>
+          <a:ln w="47625">
+            <a:solidFill>
+              <a:schemeClr val="accent2"/>
+            </a:solidFill>
+          </a:ln>
+        </p:spPr>
+        <p:style>
+          <a:lnRef idx="2">
+            <a:schemeClr val="accent1">
+              <a:shade val="15000"/>
+            </a:schemeClr>
+          </a:lnRef>
+          <a:fillRef idx="1">
+            <a:schemeClr val="accent1"/>
+          </a:fillRef>
+          <a:effectRef idx="0">
+            <a:schemeClr val="accent1"/>
+          </a:effectRef>
+          <a:fontRef idx="minor">
+            <a:schemeClr val="lt1"/>
+          </a:fontRef>
+        </p:style>
+        <p:txBody>
+          <a:bodyPr rtlCol="0" anchor="ctr"/>
+          <a:lstStyle/>
+          <a:p>
+            <a:pPr algn="ctr"/>
+            <a:endParaRPr lang="en-CA"/>
+          </a:p>
+        </p:txBody>
+      </p:sp>
+      <p:sp>
+        <p:nvSpPr>
+          <p:cNvPr id="11" name="Oval 10">
+            <a:extLst>
+              <a:ext uri="{FF2B5EF4-FFF2-40B4-BE49-F238E27FC236}">
+                <a16:creationId xmlns:a16="http://schemas.microsoft.com/office/drawing/2014/main" id="{1E833F05-03CD-AB8A-A91D-6317C9B5EEF3}"/>
+              </a:ext>
+            </a:extLst>
+          </p:cNvPr>
+          <p:cNvSpPr/>
+          <p:nvPr/>
+        </p:nvSpPr>
+        <p:spPr>
+          <a:xfrm>
+            <a:off x="6226629" y="4429318"/>
+            <a:ext cx="740230" cy="339654"/>
+          </a:xfrm>
+          <a:prstGeom prst="ellipse">
+            <a:avLst/>
+          </a:prstGeom>
+          <a:noFill/>
+          <a:ln w="47625">
+            <a:solidFill>
+              <a:schemeClr val="accent2"/>
+            </a:solidFill>
+          </a:ln>
+        </p:spPr>
+        <p:style>
+          <a:lnRef idx="2">
+            <a:schemeClr val="accent1">
+              <a:shade val="15000"/>
+            </a:schemeClr>
+          </a:lnRef>
+          <a:fillRef idx="1">
+            <a:schemeClr val="accent1"/>
+          </a:fillRef>
+          <a:effectRef idx="0">
+            <a:schemeClr val="accent1"/>
+          </a:effectRef>
+          <a:fontRef idx="minor">
+            <a:schemeClr val="lt1"/>
+          </a:fontRef>
+        </p:style>
+        <p:txBody>
+          <a:bodyPr rtlCol="0" anchor="ctr"/>
+          <a:lstStyle/>
+          <a:p>
+            <a:pPr algn="ctr"/>
+            <a:endParaRPr lang="en-CA"/>
+          </a:p>
+        </p:txBody>
+      </p:sp>
+    </p:spTree>
+    <p:extLst>
+      <p:ext uri="{BB962C8B-B14F-4D97-AF65-F5344CB8AC3E}">
+        <p14:creationId xmlns:p14="http://schemas.microsoft.com/office/powerpoint/2010/main" val="2862647310"/>
+      </p:ext>
+    </p:extLst>
+  </p:cSld>
+  <p:clrMapOvr>
+    <a:masterClrMapping/>
+  </p:clrMapOvr>
+</p:sld>
+</file>
+
+<file path=ppt/slides/slide13.xml><?xml version="1.0" encoding="utf-8"?>
+<p:sld xmlns:a="http://schemas.openxmlformats.org/drawingml/2006/main" xmlns:r="http://schemas.openxmlformats.org/officeDocument/2006/relationships" xmlns:p="http://schemas.openxmlformats.org/presentationml/2006/main">
+  <p:cSld>
+    <p:spTree>
+      <p:nvGrpSpPr>
+        <p:cNvPr id="1" name=""/>
+        <p:cNvGrpSpPr/>
+        <p:nvPr/>
+      </p:nvGrpSpPr>
+      <p:grpSpPr>
+        <a:xfrm>
+          <a:off x="0" y="0"/>
+          <a:ext cx="0" cy="0"/>
+          <a:chOff x="0" y="0"/>
+          <a:chExt cx="0" cy="0"/>
+        </a:xfrm>
+      </p:grpSpPr>
+      <p:pic>
+        <p:nvPicPr>
+          <p:cNvPr id="3" name="Picture 2">
+            <a:extLst>
+              <a:ext uri="{FF2B5EF4-FFF2-40B4-BE49-F238E27FC236}">
+                <a16:creationId xmlns:a16="http://schemas.microsoft.com/office/drawing/2014/main" id="{171657BB-990A-0133-D9B2-265BC79531B7}"/>
+              </a:ext>
+            </a:extLst>
+          </p:cNvPr>
+          <p:cNvPicPr>
+            <a:picLocks noChangeAspect="1"/>
+          </p:cNvPicPr>
+          <p:nvPr/>
+        </p:nvPicPr>
+        <p:blipFill>
+          <a:blip r:embed="rId2"/>
+          <a:stretch>
+            <a:fillRect/>
+          </a:stretch>
+        </p:blipFill>
+        <p:spPr>
+          <a:xfrm>
+            <a:off x="1153466" y="606222"/>
+            <a:ext cx="4067743" cy="5506218"/>
+          </a:xfrm>
+          <a:prstGeom prst="rect">
+            <a:avLst/>
+          </a:prstGeom>
+        </p:spPr>
+      </p:pic>
+      <p:pic>
+        <p:nvPicPr>
+          <p:cNvPr id="5" name="Picture 4">
+            <a:extLst>
+              <a:ext uri="{FF2B5EF4-FFF2-40B4-BE49-F238E27FC236}">
+                <a16:creationId xmlns:a16="http://schemas.microsoft.com/office/drawing/2014/main" id="{6D9EA9E0-AA68-2B17-B30D-0D26A023B73C}"/>
+              </a:ext>
+            </a:extLst>
+          </p:cNvPr>
+          <p:cNvPicPr>
+            <a:picLocks noChangeAspect="1"/>
+          </p:cNvPicPr>
+          <p:nvPr/>
+        </p:nvPicPr>
+        <p:blipFill>
+          <a:blip r:embed="rId3"/>
+          <a:stretch>
+            <a:fillRect/>
+          </a:stretch>
+        </p:blipFill>
+        <p:spPr>
+          <a:xfrm>
+            <a:off x="5368414" y="606222"/>
+            <a:ext cx="4067743" cy="5506218"/>
+          </a:xfrm>
+          <a:prstGeom prst="rect">
+            <a:avLst/>
+          </a:prstGeom>
+        </p:spPr>
+      </p:pic>
+      <p:sp>
+        <p:nvSpPr>
+          <p:cNvPr id="6" name="Oval 5">
+            <a:extLst>
+              <a:ext uri="{FF2B5EF4-FFF2-40B4-BE49-F238E27FC236}">
+                <a16:creationId xmlns:a16="http://schemas.microsoft.com/office/drawing/2014/main" id="{B4C76BDE-408D-CE48-0C74-EBE3924F2121}"/>
+              </a:ext>
+            </a:extLst>
+          </p:cNvPr>
+          <p:cNvSpPr/>
+          <p:nvPr/>
+        </p:nvSpPr>
+        <p:spPr>
+          <a:xfrm>
+            <a:off x="1153465" y="4136567"/>
+            <a:ext cx="1459105" cy="296096"/>
+          </a:xfrm>
+          <a:prstGeom prst="ellipse">
+            <a:avLst/>
+          </a:prstGeom>
+          <a:noFill/>
+          <a:ln w="47625">
+            <a:solidFill>
+              <a:schemeClr val="accent2"/>
+            </a:solidFill>
+          </a:ln>
+        </p:spPr>
+        <p:style>
+          <a:lnRef idx="2">
+            <a:schemeClr val="accent1">
+              <a:shade val="15000"/>
+            </a:schemeClr>
+          </a:lnRef>
+          <a:fillRef idx="1">
+            <a:schemeClr val="accent1"/>
+          </a:fillRef>
+          <a:effectRef idx="0">
+            <a:schemeClr val="accent1"/>
+          </a:effectRef>
+          <a:fontRef idx="minor">
+            <a:schemeClr val="lt1"/>
+          </a:fontRef>
+        </p:style>
+        <p:txBody>
+          <a:bodyPr rtlCol="0" anchor="ctr"/>
+          <a:lstStyle/>
+          <a:p>
+            <a:pPr algn="ctr"/>
+            <a:endParaRPr lang="en-CA"/>
+          </a:p>
+        </p:txBody>
+      </p:sp>
+      <p:sp>
+        <p:nvSpPr>
+          <p:cNvPr id="7" name="Oval 6">
+            <a:extLst>
+              <a:ext uri="{FF2B5EF4-FFF2-40B4-BE49-F238E27FC236}">
+                <a16:creationId xmlns:a16="http://schemas.microsoft.com/office/drawing/2014/main" id="{9A7C342E-2F9A-0BC8-CFF9-39D916E6980C}"/>
+              </a:ext>
+            </a:extLst>
+          </p:cNvPr>
+          <p:cNvSpPr/>
+          <p:nvPr/>
+        </p:nvSpPr>
+        <p:spPr>
+          <a:xfrm>
+            <a:off x="2934789" y="4079953"/>
+            <a:ext cx="1793965" cy="735886"/>
+          </a:xfrm>
+          <a:prstGeom prst="ellipse">
+            <a:avLst/>
+          </a:prstGeom>
+          <a:noFill/>
+          <a:ln w="47625">
+            <a:solidFill>
+              <a:schemeClr val="accent2"/>
+            </a:solidFill>
+          </a:ln>
+        </p:spPr>
+        <p:style>
+          <a:lnRef idx="2">
+            <a:schemeClr val="accent1">
+              <a:shade val="15000"/>
+            </a:schemeClr>
+          </a:lnRef>
+          <a:fillRef idx="1">
+            <a:schemeClr val="accent1"/>
+          </a:fillRef>
+          <a:effectRef idx="0">
+            <a:schemeClr val="accent1"/>
+          </a:effectRef>
+          <a:fontRef idx="minor">
+            <a:schemeClr val="lt1"/>
+          </a:fontRef>
+        </p:style>
+        <p:txBody>
+          <a:bodyPr rtlCol="0" anchor="ctr"/>
+          <a:lstStyle/>
+          <a:p>
+            <a:pPr algn="ctr"/>
+            <a:endParaRPr lang="en-CA"/>
+          </a:p>
+        </p:txBody>
+      </p:sp>
+      <p:sp>
+        <p:nvSpPr>
+          <p:cNvPr id="8" name="Oval 7">
+            <a:extLst>
+              <a:ext uri="{FF2B5EF4-FFF2-40B4-BE49-F238E27FC236}">
+                <a16:creationId xmlns:a16="http://schemas.microsoft.com/office/drawing/2014/main" id="{DF5A7D54-74CE-CA48-07BA-229F4475D367}"/>
+              </a:ext>
+            </a:extLst>
+          </p:cNvPr>
+          <p:cNvSpPr/>
+          <p:nvPr/>
+        </p:nvSpPr>
+        <p:spPr>
+          <a:xfrm>
+            <a:off x="5337951" y="4140914"/>
+            <a:ext cx="1459105" cy="296096"/>
+          </a:xfrm>
+          <a:prstGeom prst="ellipse">
+            <a:avLst/>
+          </a:prstGeom>
+          <a:noFill/>
+          <a:ln w="47625">
+            <a:solidFill>
+              <a:schemeClr val="accent2"/>
+            </a:solidFill>
+          </a:ln>
+        </p:spPr>
+        <p:style>
+          <a:lnRef idx="2">
+            <a:schemeClr val="accent1">
+              <a:shade val="15000"/>
+            </a:schemeClr>
+          </a:lnRef>
+          <a:fillRef idx="1">
+            <a:schemeClr val="accent1"/>
+          </a:fillRef>
+          <a:effectRef idx="0">
+            <a:schemeClr val="accent1"/>
+          </a:effectRef>
+          <a:fontRef idx="minor">
+            <a:schemeClr val="lt1"/>
+          </a:fontRef>
+        </p:style>
+        <p:txBody>
+          <a:bodyPr rtlCol="0" anchor="ctr"/>
+          <a:lstStyle/>
+          <a:p>
+            <a:pPr algn="ctr"/>
+            <a:endParaRPr lang="en-CA"/>
+          </a:p>
+        </p:txBody>
+      </p:sp>
+      <p:sp>
+        <p:nvSpPr>
+          <p:cNvPr id="9" name="Oval 8">
+            <a:extLst>
+              <a:ext uri="{FF2B5EF4-FFF2-40B4-BE49-F238E27FC236}">
+                <a16:creationId xmlns:a16="http://schemas.microsoft.com/office/drawing/2014/main" id="{B7E895EA-B6D5-5791-8ECC-20DC4DD88198}"/>
+              </a:ext>
+            </a:extLst>
+          </p:cNvPr>
+          <p:cNvSpPr/>
+          <p:nvPr/>
+        </p:nvSpPr>
+        <p:spPr>
+          <a:xfrm>
+            <a:off x="7119275" y="4075591"/>
+            <a:ext cx="1793965" cy="722830"/>
+          </a:xfrm>
+          <a:prstGeom prst="ellipse">
+            <a:avLst/>
+          </a:prstGeom>
+          <a:noFill/>
+          <a:ln w="47625">
+            <a:solidFill>
+              <a:schemeClr val="accent2"/>
+            </a:solidFill>
+          </a:ln>
+        </p:spPr>
+        <p:style>
+          <a:lnRef idx="2">
+            <a:schemeClr val="accent1">
+              <a:shade val="15000"/>
+            </a:schemeClr>
+          </a:lnRef>
+          <a:fillRef idx="1">
+            <a:schemeClr val="accent1"/>
+          </a:fillRef>
+          <a:effectRef idx="0">
+            <a:schemeClr val="accent1"/>
+          </a:effectRef>
+          <a:fontRef idx="minor">
+            <a:schemeClr val="lt1"/>
+          </a:fontRef>
+        </p:style>
+        <p:txBody>
+          <a:bodyPr rtlCol="0" anchor="ctr"/>
+          <a:lstStyle/>
+          <a:p>
+            <a:pPr algn="ctr"/>
+            <a:endParaRPr lang="en-CA"/>
+          </a:p>
+        </p:txBody>
+      </p:sp>
+      <p:sp>
+        <p:nvSpPr>
+          <p:cNvPr id="10" name="Oval 9">
+            <a:extLst>
+              <a:ext uri="{FF2B5EF4-FFF2-40B4-BE49-F238E27FC236}">
+                <a16:creationId xmlns:a16="http://schemas.microsoft.com/office/drawing/2014/main" id="{14E09CE4-3D7F-6D00-737E-BEA49FDD25C8}"/>
+              </a:ext>
+            </a:extLst>
+          </p:cNvPr>
+          <p:cNvSpPr/>
+          <p:nvPr/>
+        </p:nvSpPr>
+        <p:spPr>
+          <a:xfrm>
+            <a:off x="1393370" y="1467391"/>
+            <a:ext cx="548641" cy="230781"/>
+          </a:xfrm>
+          <a:prstGeom prst="ellipse">
+            <a:avLst/>
+          </a:prstGeom>
+          <a:noFill/>
+          <a:ln w="47625">
+            <a:solidFill>
+              <a:schemeClr val="accent2"/>
+            </a:solidFill>
+          </a:ln>
+        </p:spPr>
+        <p:style>
+          <a:lnRef idx="2">
+            <a:schemeClr val="accent1">
+              <a:shade val="15000"/>
+            </a:schemeClr>
+          </a:lnRef>
+          <a:fillRef idx="1">
+            <a:schemeClr val="accent1"/>
+          </a:fillRef>
+          <a:effectRef idx="0">
+            <a:schemeClr val="accent1"/>
+          </a:effectRef>
+          <a:fontRef idx="minor">
+            <a:schemeClr val="lt1"/>
+          </a:fontRef>
+        </p:style>
+        <p:txBody>
+          <a:bodyPr rtlCol="0" anchor="ctr"/>
+          <a:lstStyle/>
+          <a:p>
+            <a:pPr algn="ctr"/>
+            <a:endParaRPr lang="en-CA"/>
+          </a:p>
+        </p:txBody>
+      </p:sp>
+      <p:sp>
+        <p:nvSpPr>
+          <p:cNvPr id="11" name="Oval 10">
+            <a:extLst>
+              <a:ext uri="{FF2B5EF4-FFF2-40B4-BE49-F238E27FC236}">
+                <a16:creationId xmlns:a16="http://schemas.microsoft.com/office/drawing/2014/main" id="{CFA7FAA4-5AB8-96D4-98E7-1813657C7254}"/>
+              </a:ext>
+            </a:extLst>
+          </p:cNvPr>
+          <p:cNvSpPr/>
+          <p:nvPr/>
+        </p:nvSpPr>
+        <p:spPr>
+          <a:xfrm>
+            <a:off x="5577852" y="2926076"/>
+            <a:ext cx="548641" cy="230781"/>
+          </a:xfrm>
+          <a:prstGeom prst="ellipse">
+            <a:avLst/>
+          </a:prstGeom>
+          <a:noFill/>
+          <a:ln w="47625">
+            <a:solidFill>
+              <a:schemeClr val="accent2"/>
+            </a:solidFill>
+          </a:ln>
+        </p:spPr>
+        <p:style>
+          <a:lnRef idx="2">
+            <a:schemeClr val="accent1">
+              <a:shade val="15000"/>
+            </a:schemeClr>
+          </a:lnRef>
+          <a:fillRef idx="1">
+            <a:schemeClr val="accent1"/>
+          </a:fillRef>
+          <a:effectRef idx="0">
+            <a:schemeClr val="accent1"/>
+          </a:effectRef>
+          <a:fontRef idx="minor">
+            <a:schemeClr val="lt1"/>
+          </a:fontRef>
+        </p:style>
+        <p:txBody>
+          <a:bodyPr rtlCol="0" anchor="ctr"/>
+          <a:lstStyle/>
+          <a:p>
+            <a:pPr algn="ctr"/>
+            <a:endParaRPr lang="en-CA"/>
+          </a:p>
+        </p:txBody>
+      </p:sp>
+    </p:spTree>
+    <p:extLst>
+      <p:ext uri="{BB962C8B-B14F-4D97-AF65-F5344CB8AC3E}">
+        <p14:creationId xmlns:p14="http://schemas.microsoft.com/office/powerpoint/2010/main" val="4130742429"/>
+      </p:ext>
+    </p:extLst>
+  </p:cSld>
+  <p:clrMapOvr>
+    <a:masterClrMapping/>
+  </p:clrMapOvr>
+</p:sld>
+</file>
+
+<file path=ppt/slides/slide14.xml><?xml version="1.0" encoding="utf-8"?>
+<p:sld xmlns:a="http://schemas.openxmlformats.org/drawingml/2006/main" xmlns:r="http://schemas.openxmlformats.org/officeDocument/2006/relationships" xmlns:p="http://schemas.openxmlformats.org/presentationml/2006/main">
+  <p:cSld>
+    <p:spTree>
+      <p:nvGrpSpPr>
+        <p:cNvPr id="1" name=""/>
+        <p:cNvGrpSpPr/>
+        <p:nvPr/>
+      </p:nvGrpSpPr>
+      <p:grpSpPr>
+        <a:xfrm>
+          <a:off x="0" y="0"/>
+          <a:ext cx="0" cy="0"/>
+          <a:chOff x="0" y="0"/>
+          <a:chExt cx="0" cy="0"/>
+        </a:xfrm>
+      </p:grpSpPr>
+      <p:pic>
+        <p:nvPicPr>
+          <p:cNvPr id="3" name="Picture 2">
+            <a:extLst>
+              <a:ext uri="{FF2B5EF4-FFF2-40B4-BE49-F238E27FC236}">
+                <a16:creationId xmlns:a16="http://schemas.microsoft.com/office/drawing/2014/main" id="{9B52EEB5-8E3B-4567-42D6-3162DD1012A3}"/>
+              </a:ext>
+            </a:extLst>
+          </p:cNvPr>
+          <p:cNvPicPr>
+            <a:picLocks noChangeAspect="1"/>
+          </p:cNvPicPr>
+          <p:nvPr/>
+        </p:nvPicPr>
+        <p:blipFill>
+          <a:blip r:embed="rId2"/>
+          <a:stretch>
+            <a:fillRect/>
+          </a:stretch>
+        </p:blipFill>
+        <p:spPr>
+          <a:xfrm>
+            <a:off x="612100" y="781970"/>
+            <a:ext cx="5115639" cy="4353533"/>
+          </a:xfrm>
+          <a:prstGeom prst="rect">
+            <a:avLst/>
+          </a:prstGeom>
+        </p:spPr>
+      </p:pic>
+      <p:pic>
+        <p:nvPicPr>
+          <p:cNvPr id="5" name="Picture 4">
+            <a:extLst>
+              <a:ext uri="{FF2B5EF4-FFF2-40B4-BE49-F238E27FC236}">
+                <a16:creationId xmlns:a16="http://schemas.microsoft.com/office/drawing/2014/main" id="{FA26CA96-E2BE-9D2F-9787-D448FD49E011}"/>
+              </a:ext>
+            </a:extLst>
+          </p:cNvPr>
+          <p:cNvPicPr>
+            <a:picLocks noChangeAspect="1"/>
+          </p:cNvPicPr>
+          <p:nvPr/>
+        </p:nvPicPr>
+        <p:blipFill>
+          <a:blip r:embed="rId3"/>
+          <a:stretch>
+            <a:fillRect/>
+          </a:stretch>
+        </p:blipFill>
+        <p:spPr>
+          <a:xfrm>
+            <a:off x="5908345" y="781970"/>
+            <a:ext cx="4067743" cy="5506218"/>
+          </a:xfrm>
+          <a:prstGeom prst="rect">
+            <a:avLst/>
+          </a:prstGeom>
+        </p:spPr>
+      </p:pic>
+    </p:spTree>
+    <p:extLst>
+      <p:ext uri="{BB962C8B-B14F-4D97-AF65-F5344CB8AC3E}">
+        <p14:creationId xmlns:p14="http://schemas.microsoft.com/office/powerpoint/2010/main" val="3160844314"/>
+      </p:ext>
+    </p:extLst>
+  </p:cSld>
+  <p:clrMapOvr>
+    <a:masterClrMapping/>
+  </p:clrMapOvr>
+</p:sld>
+</file>
+
+<file path=ppt/slides/slide15.xml><?xml version="1.0" encoding="utf-8"?>
+<p:sld xmlns:a="http://schemas.openxmlformats.org/drawingml/2006/main" xmlns:r="http://schemas.openxmlformats.org/officeDocument/2006/relationships" xmlns:p="http://schemas.openxmlformats.org/presentationml/2006/main">
+  <p:cSld>
+    <p:spTree>
+      <p:nvGrpSpPr>
+        <p:cNvPr id="1" name=""/>
+        <p:cNvGrpSpPr/>
+        <p:nvPr/>
+      </p:nvGrpSpPr>
+      <p:grpSpPr>
+        <a:xfrm>
+          <a:off x="0" y="0"/>
+          <a:ext cx="0" cy="0"/>
+          <a:chOff x="0" y="0"/>
+          <a:chExt cx="0" cy="0"/>
+        </a:xfrm>
+      </p:grpSpPr>
+      <p:pic>
+        <p:nvPicPr>
+          <p:cNvPr id="5" name="Picture 4">
+            <a:extLst>
+              <a:ext uri="{FF2B5EF4-FFF2-40B4-BE49-F238E27FC236}">
+                <a16:creationId xmlns:a16="http://schemas.microsoft.com/office/drawing/2014/main" id="{07015635-5BCA-BD38-FAEA-E4DCF962909F}"/>
+              </a:ext>
+            </a:extLst>
+          </p:cNvPr>
+          <p:cNvPicPr>
+            <a:picLocks noChangeAspect="1"/>
+          </p:cNvPicPr>
+          <p:nvPr/>
+        </p:nvPicPr>
+        <p:blipFill>
+          <a:blip r:embed="rId2"/>
+          <a:stretch>
+            <a:fillRect/>
+          </a:stretch>
+        </p:blipFill>
+        <p:spPr>
+          <a:xfrm>
+            <a:off x="0" y="0"/>
+            <a:ext cx="12192000" cy="6858000"/>
+          </a:xfrm>
+          <a:prstGeom prst="rect">
+            <a:avLst/>
+          </a:prstGeom>
+        </p:spPr>
+      </p:pic>
+    </p:spTree>
+    <p:extLst>
+      <p:ext uri="{BB962C8B-B14F-4D97-AF65-F5344CB8AC3E}">
+        <p14:creationId xmlns:p14="http://schemas.microsoft.com/office/powerpoint/2010/main" val="2335861120"/>
+      </p:ext>
+    </p:extLst>
+  </p:cSld>
+  <p:clrMapOvr>
+    <a:masterClrMapping/>
+  </p:clrMapOvr>
+</p:sld>
+</file>
+
+<file path=ppt/slides/slide16.xml><?xml version="1.0" encoding="utf-8"?>
+<p:sld xmlns:a="http://schemas.openxmlformats.org/drawingml/2006/main" xmlns:r="http://schemas.openxmlformats.org/officeDocument/2006/relationships" xmlns:p="http://schemas.openxmlformats.org/presentationml/2006/main">
+  <p:cSld>
+    <p:spTree>
+      <p:nvGrpSpPr>
+        <p:cNvPr id="1" name=""/>
+        <p:cNvGrpSpPr/>
+        <p:nvPr/>
+      </p:nvGrpSpPr>
+      <p:grpSpPr>
+        <a:xfrm>
+          <a:off x="0" y="0"/>
+          <a:ext cx="0" cy="0"/>
+          <a:chOff x="0" y="0"/>
+          <a:chExt cx="0" cy="0"/>
+        </a:xfrm>
+      </p:grpSpPr>
+      <p:pic>
+        <p:nvPicPr>
+          <p:cNvPr id="5" name="Picture 4">
+            <a:extLst>
+              <a:ext uri="{FF2B5EF4-FFF2-40B4-BE49-F238E27FC236}">
+                <a16:creationId xmlns:a16="http://schemas.microsoft.com/office/drawing/2014/main" id="{A9600D48-5E45-BA31-C21C-93338E439317}"/>
+              </a:ext>
+            </a:extLst>
+          </p:cNvPr>
+          <p:cNvPicPr>
+            <a:picLocks noChangeAspect="1"/>
+          </p:cNvPicPr>
+          <p:nvPr/>
+        </p:nvPicPr>
+        <p:blipFill>
+          <a:blip r:embed="rId2"/>
+          <a:stretch>
+            <a:fillRect/>
+          </a:stretch>
+        </p:blipFill>
+        <p:spPr>
+          <a:xfrm>
+            <a:off x="8502969" y="2351379"/>
+            <a:ext cx="2894089" cy="3519838"/>
+          </a:xfrm>
+          <a:prstGeom prst="rect">
+            <a:avLst/>
+          </a:prstGeom>
+        </p:spPr>
+      </p:pic>
+      <p:pic>
+        <p:nvPicPr>
+          <p:cNvPr id="7" name="Picture 6">
+            <a:extLst>
+              <a:ext uri="{FF2B5EF4-FFF2-40B4-BE49-F238E27FC236}">
+                <a16:creationId xmlns:a16="http://schemas.microsoft.com/office/drawing/2014/main" id="{D8F7468B-6DFD-E6A0-6451-E997013D9444}"/>
+              </a:ext>
+            </a:extLst>
+          </p:cNvPr>
+          <p:cNvPicPr>
+            <a:picLocks noChangeAspect="1"/>
+          </p:cNvPicPr>
+          <p:nvPr/>
+        </p:nvPicPr>
+        <p:blipFill>
+          <a:blip r:embed="rId3"/>
+          <a:stretch>
+            <a:fillRect/>
+          </a:stretch>
+        </p:blipFill>
+        <p:spPr>
+          <a:xfrm>
+            <a:off x="570202" y="2353071"/>
+            <a:ext cx="4764225" cy="3605167"/>
+          </a:xfrm>
+          <a:prstGeom prst="rect">
+            <a:avLst/>
+          </a:prstGeom>
+        </p:spPr>
+      </p:pic>
+      <p:pic>
+        <p:nvPicPr>
+          <p:cNvPr id="9" name="Picture 8">
+            <a:extLst>
+              <a:ext uri="{FF2B5EF4-FFF2-40B4-BE49-F238E27FC236}">
+                <a16:creationId xmlns:a16="http://schemas.microsoft.com/office/drawing/2014/main" id="{CC720DA8-F9D3-A2E6-66A5-176B4D40A90F}"/>
+              </a:ext>
+            </a:extLst>
+          </p:cNvPr>
+          <p:cNvPicPr>
+            <a:picLocks noChangeAspect="1"/>
+          </p:cNvPicPr>
+          <p:nvPr/>
+        </p:nvPicPr>
+        <p:blipFill>
+          <a:blip r:embed="rId4"/>
+          <a:stretch>
+            <a:fillRect/>
+          </a:stretch>
+        </p:blipFill>
+        <p:spPr>
+          <a:xfrm>
+            <a:off x="5377788" y="2351379"/>
+            <a:ext cx="3081820" cy="4143407"/>
+          </a:xfrm>
+          <a:prstGeom prst="rect">
+            <a:avLst/>
+          </a:prstGeom>
+        </p:spPr>
+      </p:pic>
+      <p:sp>
+        <p:nvSpPr>
+          <p:cNvPr id="10" name="Oval 9">
+            <a:extLst>
+              <a:ext uri="{FF2B5EF4-FFF2-40B4-BE49-F238E27FC236}">
+                <a16:creationId xmlns:a16="http://schemas.microsoft.com/office/drawing/2014/main" id="{A7BD5686-C9F6-4FCC-1B38-02A06CF173AA}"/>
+              </a:ext>
+            </a:extLst>
+          </p:cNvPr>
+          <p:cNvSpPr/>
+          <p:nvPr/>
+        </p:nvSpPr>
+        <p:spPr>
+          <a:xfrm>
+            <a:off x="570202" y="2464521"/>
+            <a:ext cx="1876907" cy="296096"/>
+          </a:xfrm>
+          <a:prstGeom prst="ellipse">
+            <a:avLst/>
+          </a:prstGeom>
+          <a:noFill/>
+          <a:ln w="47625">
+            <a:solidFill>
+              <a:schemeClr val="accent2"/>
+            </a:solidFill>
+          </a:ln>
+        </p:spPr>
+        <p:style>
+          <a:lnRef idx="2">
+            <a:schemeClr val="accent1">
+              <a:shade val="15000"/>
+            </a:schemeClr>
+          </a:lnRef>
+          <a:fillRef idx="1">
+            <a:schemeClr val="accent1"/>
+          </a:fillRef>
+          <a:effectRef idx="0">
+            <a:schemeClr val="accent1"/>
+          </a:effectRef>
+          <a:fontRef idx="minor">
+            <a:schemeClr val="lt1"/>
+          </a:fontRef>
+        </p:style>
+        <p:txBody>
+          <a:bodyPr rtlCol="0" anchor="ctr"/>
+          <a:lstStyle/>
+          <a:p>
+            <a:pPr algn="ctr"/>
+            <a:endParaRPr lang="en-CA"/>
+          </a:p>
+        </p:txBody>
+      </p:sp>
+      <p:sp>
+        <p:nvSpPr>
+          <p:cNvPr id="11" name="Oval 10">
+            <a:extLst>
+              <a:ext uri="{FF2B5EF4-FFF2-40B4-BE49-F238E27FC236}">
+                <a16:creationId xmlns:a16="http://schemas.microsoft.com/office/drawing/2014/main" id="{43DE5923-D000-61BD-A0F8-E5B072591798}"/>
+              </a:ext>
+            </a:extLst>
+          </p:cNvPr>
+          <p:cNvSpPr/>
+          <p:nvPr/>
+        </p:nvSpPr>
+        <p:spPr>
+          <a:xfrm>
+            <a:off x="4894217" y="3056709"/>
+            <a:ext cx="269965" cy="235131"/>
+          </a:xfrm>
+          <a:prstGeom prst="ellipse">
+            <a:avLst/>
+          </a:prstGeom>
+          <a:noFill/>
+          <a:ln w="47625">
+            <a:solidFill>
+              <a:schemeClr val="accent2"/>
+            </a:solidFill>
+          </a:ln>
+        </p:spPr>
+        <p:style>
+          <a:lnRef idx="2">
+            <a:schemeClr val="accent1">
+              <a:shade val="15000"/>
+            </a:schemeClr>
+          </a:lnRef>
+          <a:fillRef idx="1">
+            <a:schemeClr val="accent1"/>
+          </a:fillRef>
+          <a:effectRef idx="0">
+            <a:schemeClr val="accent1"/>
+          </a:effectRef>
+          <a:fontRef idx="minor">
+            <a:schemeClr val="lt1"/>
+          </a:fontRef>
+        </p:style>
+        <p:txBody>
+          <a:bodyPr rtlCol="0" anchor="ctr"/>
+          <a:lstStyle/>
+          <a:p>
+            <a:pPr algn="ctr"/>
+            <a:endParaRPr lang="en-CA"/>
+          </a:p>
+        </p:txBody>
+      </p:sp>
+      <p:pic>
+        <p:nvPicPr>
+          <p:cNvPr id="13" name="Picture 12">
+            <a:extLst>
+              <a:ext uri="{FF2B5EF4-FFF2-40B4-BE49-F238E27FC236}">
+                <a16:creationId xmlns:a16="http://schemas.microsoft.com/office/drawing/2014/main" id="{7298B2EE-1E02-16B1-032E-F0EE40B985EB}"/>
+              </a:ext>
+            </a:extLst>
+          </p:cNvPr>
+          <p:cNvPicPr>
+            <a:picLocks noChangeAspect="1"/>
+          </p:cNvPicPr>
+          <p:nvPr/>
+        </p:nvPicPr>
+        <p:blipFill>
+          <a:blip r:embed="rId5"/>
+          <a:stretch>
+            <a:fillRect/>
+          </a:stretch>
+        </p:blipFill>
+        <p:spPr>
+          <a:xfrm>
+            <a:off x="5689539" y="771781"/>
+            <a:ext cx="238158" cy="228632"/>
+          </a:xfrm>
+          <a:prstGeom prst="rect">
+            <a:avLst/>
+          </a:prstGeom>
+        </p:spPr>
+      </p:pic>
+      <p:sp>
+        <p:nvSpPr>
+          <p:cNvPr id="14" name="Oval 13">
+            <a:extLst>
+              <a:ext uri="{FF2B5EF4-FFF2-40B4-BE49-F238E27FC236}">
+                <a16:creationId xmlns:a16="http://schemas.microsoft.com/office/drawing/2014/main" id="{CA42389D-C50A-CA24-8961-E4FD5D1D5A67}"/>
+              </a:ext>
+            </a:extLst>
+          </p:cNvPr>
+          <p:cNvSpPr/>
+          <p:nvPr/>
+        </p:nvSpPr>
+        <p:spPr>
+          <a:xfrm>
+            <a:off x="7711439" y="2542904"/>
+            <a:ext cx="269965" cy="235131"/>
+          </a:xfrm>
+          <a:prstGeom prst="ellipse">
+            <a:avLst/>
+          </a:prstGeom>
+          <a:noFill/>
+          <a:ln w="47625">
+            <a:solidFill>
+              <a:schemeClr val="accent2"/>
+            </a:solidFill>
+          </a:ln>
+        </p:spPr>
+        <p:style>
+          <a:lnRef idx="2">
+            <a:schemeClr val="accent1">
+              <a:shade val="15000"/>
+            </a:schemeClr>
+          </a:lnRef>
+          <a:fillRef idx="1">
+            <a:schemeClr val="accent1"/>
+          </a:fillRef>
+          <a:effectRef idx="0">
+            <a:schemeClr val="accent1"/>
+          </a:effectRef>
+          <a:fontRef idx="minor">
+            <a:schemeClr val="lt1"/>
+          </a:fontRef>
+        </p:style>
+        <p:txBody>
+          <a:bodyPr rtlCol="0" anchor="ctr"/>
+          <a:lstStyle/>
+          <a:p>
+            <a:pPr algn="ctr"/>
+            <a:endParaRPr lang="en-CA"/>
+          </a:p>
+        </p:txBody>
+      </p:sp>
+      <p:sp>
+        <p:nvSpPr>
+          <p:cNvPr id="15" name="Oval 14">
+            <a:extLst>
+              <a:ext uri="{FF2B5EF4-FFF2-40B4-BE49-F238E27FC236}">
+                <a16:creationId xmlns:a16="http://schemas.microsoft.com/office/drawing/2014/main" id="{D83DD721-4952-7496-AB26-C8B296A8FAD2}"/>
+              </a:ext>
+            </a:extLst>
+          </p:cNvPr>
+          <p:cNvSpPr/>
+          <p:nvPr/>
+        </p:nvSpPr>
+        <p:spPr>
+          <a:xfrm>
+            <a:off x="5334427" y="2556842"/>
+            <a:ext cx="1249253" cy="203775"/>
+          </a:xfrm>
+          <a:prstGeom prst="ellipse">
+            <a:avLst/>
+          </a:prstGeom>
+          <a:noFill/>
+          <a:ln w="47625">
+            <a:solidFill>
+              <a:schemeClr val="accent2"/>
+            </a:solidFill>
+          </a:ln>
+        </p:spPr>
+        <p:style>
+          <a:lnRef idx="2">
+            <a:schemeClr val="accent1">
+              <a:shade val="15000"/>
+            </a:schemeClr>
+          </a:lnRef>
+          <a:fillRef idx="1">
+            <a:schemeClr val="accent1"/>
+          </a:fillRef>
+          <a:effectRef idx="0">
+            <a:schemeClr val="accent1"/>
+          </a:effectRef>
+          <a:fontRef idx="minor">
+            <a:schemeClr val="lt1"/>
+          </a:fontRef>
+        </p:style>
+        <p:txBody>
+          <a:bodyPr rtlCol="0" anchor="ctr"/>
+          <a:lstStyle/>
+          <a:p>
+            <a:pPr algn="ctr"/>
+            <a:endParaRPr lang="en-CA"/>
+          </a:p>
+        </p:txBody>
+      </p:sp>
+      <p:sp>
+        <p:nvSpPr>
+          <p:cNvPr id="17" name="Oval 16">
+            <a:extLst>
+              <a:ext uri="{FF2B5EF4-FFF2-40B4-BE49-F238E27FC236}">
+                <a16:creationId xmlns:a16="http://schemas.microsoft.com/office/drawing/2014/main" id="{2906ED39-9B73-B76B-F66F-011C038554F1}"/>
+              </a:ext>
+            </a:extLst>
+          </p:cNvPr>
+          <p:cNvSpPr/>
+          <p:nvPr/>
+        </p:nvSpPr>
+        <p:spPr>
+          <a:xfrm>
+            <a:off x="9370423" y="3117669"/>
+            <a:ext cx="1436914" cy="548640"/>
+          </a:xfrm>
+          <a:prstGeom prst="ellipse">
+            <a:avLst/>
+          </a:prstGeom>
+          <a:noFill/>
+          <a:ln w="47625">
+            <a:solidFill>
+              <a:schemeClr val="accent2"/>
+            </a:solidFill>
+          </a:ln>
+        </p:spPr>
+        <p:style>
+          <a:lnRef idx="2">
+            <a:schemeClr val="accent1">
+              <a:shade val="15000"/>
+            </a:schemeClr>
+          </a:lnRef>
+          <a:fillRef idx="1">
+            <a:schemeClr val="accent1"/>
+          </a:fillRef>
+          <a:effectRef idx="0">
+            <a:schemeClr val="accent1"/>
+          </a:effectRef>
+          <a:fontRef idx="minor">
+            <a:schemeClr val="lt1"/>
+          </a:fontRef>
+        </p:style>
+        <p:txBody>
+          <a:bodyPr rtlCol="0" anchor="ctr"/>
+          <a:lstStyle/>
+          <a:p>
+            <a:pPr algn="ctr"/>
+            <a:endParaRPr lang="en-CA"/>
+          </a:p>
+        </p:txBody>
+      </p:sp>
+      <p:sp>
+        <p:nvSpPr>
+          <p:cNvPr id="18" name="Oval 17">
+            <a:extLst>
+              <a:ext uri="{FF2B5EF4-FFF2-40B4-BE49-F238E27FC236}">
+                <a16:creationId xmlns:a16="http://schemas.microsoft.com/office/drawing/2014/main" id="{964C7E64-1E84-7698-0174-FC21FC47EBC3}"/>
+              </a:ext>
+            </a:extLst>
+          </p:cNvPr>
+          <p:cNvSpPr/>
+          <p:nvPr/>
+        </p:nvSpPr>
+        <p:spPr>
+          <a:xfrm>
+            <a:off x="3239589" y="2991394"/>
+            <a:ext cx="1654628" cy="762000"/>
+          </a:xfrm>
+          <a:prstGeom prst="ellipse">
+            <a:avLst/>
+          </a:prstGeom>
+          <a:noFill/>
+          <a:ln w="47625">
+            <a:solidFill>
+              <a:schemeClr val="accent2"/>
+            </a:solidFill>
+          </a:ln>
+        </p:spPr>
+        <p:style>
+          <a:lnRef idx="2">
+            <a:schemeClr val="accent1">
+              <a:shade val="15000"/>
+            </a:schemeClr>
+          </a:lnRef>
+          <a:fillRef idx="1">
+            <a:schemeClr val="accent1"/>
+          </a:fillRef>
+          <a:effectRef idx="0">
+            <a:schemeClr val="accent1"/>
+          </a:effectRef>
+          <a:fontRef idx="minor">
+            <a:schemeClr val="lt1"/>
+          </a:fontRef>
+        </p:style>
+        <p:txBody>
+          <a:bodyPr rtlCol="0" anchor="ctr"/>
+          <a:lstStyle/>
+          <a:p>
+            <a:pPr algn="ctr"/>
+            <a:endParaRPr lang="en-CA"/>
+          </a:p>
+        </p:txBody>
+      </p:sp>
+    </p:spTree>
+    <p:extLst>
+      <p:ext uri="{BB962C8B-B14F-4D97-AF65-F5344CB8AC3E}">
+        <p14:creationId xmlns:p14="http://schemas.microsoft.com/office/powerpoint/2010/main" val="2837611446"/>
+      </p:ext>
+    </p:extLst>
+  </p:cSld>
+  <p:clrMapOvr>
+    <a:masterClrMapping/>
+  </p:clrMapOvr>
+</p:sld>
+</file>
+
+<file path=ppt/slides/slide2.xml><?xml version="1.0" encoding="utf-8"?>
+<p:sld xmlns:a="http://schemas.openxmlformats.org/drawingml/2006/main" xmlns:r="http://schemas.openxmlformats.org/officeDocument/2006/relationships" xmlns:p="http://schemas.openxmlformats.org/presentationml/2006/main">
+  <p:cSld>
+    <p:spTree>
+      <p:nvGrpSpPr>
+        <p:cNvPr id="1" name=""/>
+        <p:cNvGrpSpPr/>
+        <p:nvPr/>
+      </p:nvGrpSpPr>
+      <p:grpSpPr>
+        <a:xfrm>
+          <a:off x="0" y="0"/>
+          <a:ext cx="0" cy="0"/>
+          <a:chOff x="0" y="0"/>
+          <a:chExt cx="0" cy="0"/>
+        </a:xfrm>
+      </p:grpSpPr>
+      <p:pic>
+        <p:nvPicPr>
+          <p:cNvPr id="5" name="Picture 4">
+            <a:extLst>
+              <a:ext uri="{FF2B5EF4-FFF2-40B4-BE49-F238E27FC236}">
+                <a16:creationId xmlns:a16="http://schemas.microsoft.com/office/drawing/2014/main" id="{685629AA-8C74-D367-8BD5-A23E5DDE04D0}"/>
+              </a:ext>
+            </a:extLst>
+          </p:cNvPr>
+          <p:cNvPicPr>
+            <a:picLocks noChangeAspect="1"/>
+          </p:cNvPicPr>
+          <p:nvPr/>
+        </p:nvPicPr>
+        <p:blipFill>
+          <a:blip r:embed="rId2"/>
+          <a:stretch>
+            <a:fillRect/>
+          </a:stretch>
+        </p:blipFill>
+        <p:spPr>
+          <a:xfrm>
+            <a:off x="0" y="0"/>
+            <a:ext cx="12192000" cy="6858000"/>
+          </a:xfrm>
+          <a:prstGeom prst="rect">
+            <a:avLst/>
+          </a:prstGeom>
+        </p:spPr>
+      </p:pic>
+    </p:spTree>
+    <p:extLst>
+      <p:ext uri="{BB962C8B-B14F-4D97-AF65-F5344CB8AC3E}">
+        <p14:creationId xmlns:p14="http://schemas.microsoft.com/office/powerpoint/2010/main" val="890157228"/>
+      </p:ext>
+    </p:extLst>
+  </p:cSld>
+  <p:clrMapOvr>
+    <a:masterClrMapping/>
+  </p:clrMapOvr>
+</p:sld>
+</file>
+
+<file path=ppt/slides/slide3.xml><?xml version="1.0" encoding="utf-8"?>
+<p:sld xmlns:a="http://schemas.openxmlformats.org/drawingml/2006/main" xmlns:r="http://schemas.openxmlformats.org/officeDocument/2006/relationships" xmlns:p="http://schemas.openxmlformats.org/presentationml/2006/main">
+  <p:cSld>
+    <p:spTree>
+      <p:nvGrpSpPr>
+        <p:cNvPr id="1" name=""/>
+        <p:cNvGrpSpPr/>
+        <p:nvPr/>
+      </p:nvGrpSpPr>
+      <p:grpSpPr>
+        <a:xfrm>
+          <a:off x="0" y="0"/>
+          <a:ext cx="0" cy="0"/>
+          <a:chOff x="0" y="0"/>
+          <a:chExt cx="0" cy="0"/>
+        </a:xfrm>
+      </p:grpSpPr>
+      <p:pic>
+        <p:nvPicPr>
+          <p:cNvPr id="3" name="Picture 2">
+            <a:extLst>
+              <a:ext uri="{FF2B5EF4-FFF2-40B4-BE49-F238E27FC236}">
+                <a16:creationId xmlns:a16="http://schemas.microsoft.com/office/drawing/2014/main" id="{7BC098EB-7716-BAF8-E30A-1F4B9878019D}"/>
+              </a:ext>
+            </a:extLst>
+          </p:cNvPr>
+          <p:cNvPicPr>
+            <a:picLocks noChangeAspect="1"/>
+          </p:cNvPicPr>
+          <p:nvPr/>
+        </p:nvPicPr>
+        <p:blipFill>
+          <a:blip r:embed="rId2"/>
+          <a:stretch>
+            <a:fillRect/>
+          </a:stretch>
+        </p:blipFill>
+        <p:spPr>
+          <a:xfrm>
+            <a:off x="3771575" y="156706"/>
+            <a:ext cx="4648849" cy="6544588"/>
+          </a:xfrm>
+          <a:prstGeom prst="rect">
+            <a:avLst/>
+          </a:prstGeom>
+        </p:spPr>
+      </p:pic>
+    </p:spTree>
+    <p:extLst>
+      <p:ext uri="{BB962C8B-B14F-4D97-AF65-F5344CB8AC3E}">
+        <p14:creationId xmlns:p14="http://schemas.microsoft.com/office/powerpoint/2010/main" val="3468562974"/>
+      </p:ext>
+    </p:extLst>
+  </p:cSld>
+  <p:clrMapOvr>
+    <a:masterClrMapping/>
+  </p:clrMapOvr>
+</p:sld>
+</file>
+
+<file path=ppt/slides/slide4.xml><?xml version="1.0" encoding="utf-8"?>
+<p:sld xmlns:a="http://schemas.openxmlformats.org/drawingml/2006/main" xmlns:r="http://schemas.openxmlformats.org/officeDocument/2006/relationships" xmlns:p="http://schemas.openxmlformats.org/presentationml/2006/main">
+  <p:cSld>
+    <p:spTree>
+      <p:nvGrpSpPr>
+        <p:cNvPr id="1" name=""/>
+        <p:cNvGrpSpPr/>
+        <p:nvPr/>
+      </p:nvGrpSpPr>
+      <p:grpSpPr>
+        <a:xfrm>
+          <a:off x="0" y="0"/>
+          <a:ext cx="0" cy="0"/>
+          <a:chOff x="0" y="0"/>
+          <a:chExt cx="0" cy="0"/>
+        </a:xfrm>
+      </p:grpSpPr>
+      <p:pic>
+        <p:nvPicPr>
+          <p:cNvPr id="7" name="Picture 6">
+            <a:extLst>
+              <a:ext uri="{FF2B5EF4-FFF2-40B4-BE49-F238E27FC236}">
+                <a16:creationId xmlns:a16="http://schemas.microsoft.com/office/drawing/2014/main" id="{BA1883A2-B136-07C6-BFCA-70C69CE5C472}"/>
+              </a:ext>
+            </a:extLst>
+          </p:cNvPr>
+          <p:cNvPicPr>
+            <a:picLocks noChangeAspect="1"/>
+          </p:cNvPicPr>
+          <p:nvPr/>
+        </p:nvPicPr>
+        <p:blipFill>
+          <a:blip r:embed="rId2"/>
+          <a:stretch>
+            <a:fillRect/>
+          </a:stretch>
+        </p:blipFill>
+        <p:spPr>
+          <a:xfrm>
+            <a:off x="2297162" y="1468742"/>
+            <a:ext cx="7754432" cy="4077269"/>
+          </a:xfrm>
+          <a:prstGeom prst="rect">
+            <a:avLst/>
+          </a:prstGeom>
+        </p:spPr>
+      </p:pic>
+      <p:sp>
+        <p:nvSpPr>
+          <p:cNvPr id="4" name="Oval 3">
+            <a:extLst>
+              <a:ext uri="{FF2B5EF4-FFF2-40B4-BE49-F238E27FC236}">
+                <a16:creationId xmlns:a16="http://schemas.microsoft.com/office/drawing/2014/main" id="{17429DC3-F2DB-5A04-4D2D-88AFCB86CC5C}"/>
+              </a:ext>
+            </a:extLst>
+          </p:cNvPr>
+          <p:cNvSpPr/>
+          <p:nvPr/>
+        </p:nvSpPr>
+        <p:spPr>
+          <a:xfrm>
+            <a:off x="2812869" y="4058192"/>
+            <a:ext cx="470262" cy="478974"/>
+          </a:xfrm>
+          <a:prstGeom prst="ellipse">
+            <a:avLst/>
+          </a:prstGeom>
+          <a:noFill/>
+          <a:ln w="47625">
+            <a:solidFill>
+              <a:schemeClr val="accent2"/>
+            </a:solidFill>
+          </a:ln>
+        </p:spPr>
+        <p:style>
+          <a:lnRef idx="2">
+            <a:schemeClr val="accent1">
+              <a:shade val="15000"/>
+            </a:schemeClr>
+          </a:lnRef>
+          <a:fillRef idx="1">
+            <a:schemeClr val="accent1"/>
+          </a:fillRef>
+          <a:effectRef idx="0">
+            <a:schemeClr val="accent1"/>
+          </a:effectRef>
+          <a:fontRef idx="minor">
+            <a:schemeClr val="lt1"/>
+          </a:fontRef>
+        </p:style>
+        <p:txBody>
+          <a:bodyPr rtlCol="0" anchor="ctr"/>
+          <a:lstStyle/>
+          <a:p>
+            <a:pPr algn="ctr"/>
+            <a:endParaRPr lang="en-CA"/>
+          </a:p>
+        </p:txBody>
+      </p:sp>
+      <p:sp>
+        <p:nvSpPr>
+          <p:cNvPr id="5" name="Oval 4">
+            <a:extLst>
+              <a:ext uri="{FF2B5EF4-FFF2-40B4-BE49-F238E27FC236}">
+                <a16:creationId xmlns:a16="http://schemas.microsoft.com/office/drawing/2014/main" id="{DA968DA1-7628-D60E-C576-95D0946F596A}"/>
+              </a:ext>
+            </a:extLst>
+          </p:cNvPr>
+          <p:cNvSpPr/>
+          <p:nvPr/>
+        </p:nvSpPr>
+        <p:spPr>
+          <a:xfrm>
+            <a:off x="4151810" y="2438401"/>
+            <a:ext cx="1639389" cy="263438"/>
+          </a:xfrm>
+          <a:prstGeom prst="ellipse">
+            <a:avLst/>
+          </a:prstGeom>
+          <a:noFill/>
+          <a:ln w="47625">
+            <a:solidFill>
+              <a:schemeClr val="accent2"/>
+            </a:solidFill>
+          </a:ln>
+        </p:spPr>
+        <p:style>
+          <a:lnRef idx="2">
+            <a:schemeClr val="accent1">
+              <a:shade val="15000"/>
+            </a:schemeClr>
+          </a:lnRef>
+          <a:fillRef idx="1">
+            <a:schemeClr val="accent1"/>
+          </a:fillRef>
+          <a:effectRef idx="0">
+            <a:schemeClr val="accent1"/>
+          </a:effectRef>
+          <a:fontRef idx="minor">
+            <a:schemeClr val="lt1"/>
+          </a:fontRef>
+        </p:style>
+        <p:txBody>
+          <a:bodyPr rtlCol="0" anchor="ctr"/>
+          <a:lstStyle/>
+          <a:p>
+            <a:pPr algn="ctr"/>
+            <a:endParaRPr lang="en-CA"/>
+          </a:p>
+        </p:txBody>
+      </p:sp>
+    </p:spTree>
+    <p:extLst>
+      <p:ext uri="{BB962C8B-B14F-4D97-AF65-F5344CB8AC3E}">
+        <p14:creationId xmlns:p14="http://schemas.microsoft.com/office/powerpoint/2010/main" val="1853391992"/>
+      </p:ext>
+    </p:extLst>
+  </p:cSld>
+  <p:clrMapOvr>
+    <a:masterClrMapping/>
+  </p:clrMapOvr>
+</p:sld>
+</file>
+
+<file path=ppt/slides/slide5.xml><?xml version="1.0" encoding="utf-8"?>
+<p:sld xmlns:a="http://schemas.openxmlformats.org/drawingml/2006/main" xmlns:r="http://schemas.openxmlformats.org/officeDocument/2006/relationships" xmlns:p="http://schemas.openxmlformats.org/presentationml/2006/main">
+  <p:cSld>
+    <p:spTree>
+      <p:nvGrpSpPr>
+        <p:cNvPr id="1" name=""/>
+        <p:cNvGrpSpPr/>
+        <p:nvPr/>
+      </p:nvGrpSpPr>
+      <p:grpSpPr>
+        <a:xfrm>
+          <a:off x="0" y="0"/>
+          <a:ext cx="0" cy="0"/>
+          <a:chOff x="0" y="0"/>
+          <a:chExt cx="0" cy="0"/>
+        </a:xfrm>
+      </p:grpSpPr>
+      <p:pic>
+        <p:nvPicPr>
+          <p:cNvPr id="3" name="Picture 2">
+            <a:extLst>
+              <a:ext uri="{FF2B5EF4-FFF2-40B4-BE49-F238E27FC236}">
+                <a16:creationId xmlns:a16="http://schemas.microsoft.com/office/drawing/2014/main" id="{D28D8158-8938-B8D6-200A-C46214C0802F}"/>
+              </a:ext>
+            </a:extLst>
+          </p:cNvPr>
+          <p:cNvPicPr>
+            <a:picLocks noChangeAspect="1"/>
+          </p:cNvPicPr>
+          <p:nvPr/>
+        </p:nvPicPr>
+        <p:blipFill>
+          <a:blip r:embed="rId2"/>
+          <a:stretch>
+            <a:fillRect/>
+          </a:stretch>
+        </p:blipFill>
+        <p:spPr>
+          <a:xfrm>
+            <a:off x="0" y="0"/>
+            <a:ext cx="12192000" cy="6858000"/>
+          </a:xfrm>
+          <a:prstGeom prst="rect">
+            <a:avLst/>
+          </a:prstGeom>
+        </p:spPr>
+      </p:pic>
+    </p:spTree>
+    <p:extLst>
+      <p:ext uri="{BB962C8B-B14F-4D97-AF65-F5344CB8AC3E}">
+        <p14:creationId xmlns:p14="http://schemas.microsoft.com/office/powerpoint/2010/main" val="3442168164"/>
+      </p:ext>
+    </p:extLst>
+  </p:cSld>
+  <p:clrMapOvr>
+    <a:masterClrMapping/>
+  </p:clrMapOvr>
+</p:sld>
+</file>
+
+<file path=ppt/slides/slide6.xml><?xml version="1.0" encoding="utf-8"?>
+<p:sld xmlns:a="http://schemas.openxmlformats.org/drawingml/2006/main" xmlns:r="http://schemas.openxmlformats.org/officeDocument/2006/relationships" xmlns:p="http://schemas.openxmlformats.org/presentationml/2006/main">
+  <p:cSld>
+    <p:spTree>
+      <p:nvGrpSpPr>
+        <p:cNvPr id="1" name=""/>
+        <p:cNvGrpSpPr/>
+        <p:nvPr/>
+      </p:nvGrpSpPr>
+      <p:grpSpPr>
+        <a:xfrm>
+          <a:off x="0" y="0"/>
+          <a:ext cx="0" cy="0"/>
+          <a:chOff x="0" y="0"/>
+          <a:chExt cx="0" cy="0"/>
+        </a:xfrm>
+      </p:grpSpPr>
+      <p:pic>
+        <p:nvPicPr>
+          <p:cNvPr id="3" name="Picture 2">
+            <a:extLst>
+              <a:ext uri="{FF2B5EF4-FFF2-40B4-BE49-F238E27FC236}">
+                <a16:creationId xmlns:a16="http://schemas.microsoft.com/office/drawing/2014/main" id="{A0B5091A-6EC0-7CA9-48B4-F58374FA4C40}"/>
+              </a:ext>
+            </a:extLst>
+          </p:cNvPr>
+          <p:cNvPicPr>
+            <a:picLocks noChangeAspect="1"/>
+          </p:cNvPicPr>
+          <p:nvPr/>
+        </p:nvPicPr>
+        <p:blipFill>
+          <a:blip r:embed="rId2"/>
+          <a:stretch>
+            <a:fillRect/>
+          </a:stretch>
+        </p:blipFill>
+        <p:spPr>
+          <a:xfrm>
+            <a:off x="1661675" y="2428735"/>
+            <a:ext cx="2372056" cy="1000265"/>
+          </a:xfrm>
+          <a:prstGeom prst="rect">
+            <a:avLst/>
+          </a:prstGeom>
+        </p:spPr>
+      </p:pic>
+      <p:pic>
+        <p:nvPicPr>
+          <p:cNvPr id="5" name="Picture 4">
+            <a:extLst>
+              <a:ext uri="{FF2B5EF4-FFF2-40B4-BE49-F238E27FC236}">
+                <a16:creationId xmlns:a16="http://schemas.microsoft.com/office/drawing/2014/main" id="{82411159-6532-816D-41E9-D4450D1FF13C}"/>
+              </a:ext>
+            </a:extLst>
+          </p:cNvPr>
+          <p:cNvPicPr>
+            <a:picLocks noChangeAspect="1"/>
+          </p:cNvPicPr>
+          <p:nvPr/>
+        </p:nvPicPr>
+        <p:blipFill>
+          <a:blip r:embed="rId3"/>
+          <a:stretch>
+            <a:fillRect/>
+          </a:stretch>
+        </p:blipFill>
+        <p:spPr>
+          <a:xfrm>
+            <a:off x="4332424" y="2428735"/>
+            <a:ext cx="3248478" cy="3210373"/>
+          </a:xfrm>
+          <a:prstGeom prst="rect">
+            <a:avLst/>
+          </a:prstGeom>
+        </p:spPr>
+      </p:pic>
+      <p:sp>
+        <p:nvSpPr>
+          <p:cNvPr id="6" name="Oval 5">
+            <a:extLst>
+              <a:ext uri="{FF2B5EF4-FFF2-40B4-BE49-F238E27FC236}">
+                <a16:creationId xmlns:a16="http://schemas.microsoft.com/office/drawing/2014/main" id="{CC5DAB1E-DBE1-E6B8-6AC2-2164E2D0B18A}"/>
+              </a:ext>
+            </a:extLst>
+          </p:cNvPr>
+          <p:cNvSpPr/>
+          <p:nvPr/>
+        </p:nvSpPr>
+        <p:spPr>
+          <a:xfrm>
+            <a:off x="3309256" y="2472280"/>
+            <a:ext cx="724475" cy="351481"/>
+          </a:xfrm>
+          <a:prstGeom prst="ellipse">
+            <a:avLst/>
+          </a:prstGeom>
+          <a:noFill/>
+          <a:ln w="47625">
+            <a:solidFill>
+              <a:schemeClr val="accent2"/>
+            </a:solidFill>
+          </a:ln>
+        </p:spPr>
+        <p:style>
+          <a:lnRef idx="2">
+            <a:schemeClr val="accent1">
+              <a:shade val="15000"/>
+            </a:schemeClr>
+          </a:lnRef>
+          <a:fillRef idx="1">
+            <a:schemeClr val="accent1"/>
+          </a:fillRef>
+          <a:effectRef idx="0">
+            <a:schemeClr val="accent1"/>
+          </a:effectRef>
+          <a:fontRef idx="minor">
+            <a:schemeClr val="lt1"/>
+          </a:fontRef>
+        </p:style>
+        <p:txBody>
+          <a:bodyPr rtlCol="0" anchor="ctr"/>
+          <a:lstStyle/>
+          <a:p>
+            <a:pPr algn="ctr"/>
+            <a:endParaRPr lang="en-CA"/>
+          </a:p>
+        </p:txBody>
+      </p:sp>
+      <p:pic>
+        <p:nvPicPr>
+          <p:cNvPr id="8" name="Picture 7">
+            <a:extLst>
+              <a:ext uri="{FF2B5EF4-FFF2-40B4-BE49-F238E27FC236}">
+                <a16:creationId xmlns:a16="http://schemas.microsoft.com/office/drawing/2014/main" id="{F027EAB4-600C-01A3-55A3-41659667DCA5}"/>
+              </a:ext>
+            </a:extLst>
+          </p:cNvPr>
+          <p:cNvPicPr>
+            <a:picLocks noChangeAspect="1"/>
+          </p:cNvPicPr>
+          <p:nvPr/>
+        </p:nvPicPr>
+        <p:blipFill>
+          <a:blip r:embed="rId4"/>
+          <a:stretch>
+            <a:fillRect/>
+          </a:stretch>
+        </p:blipFill>
+        <p:spPr>
+          <a:xfrm>
+            <a:off x="5337107" y="461028"/>
+            <a:ext cx="333422" cy="342948"/>
+          </a:xfrm>
+          <a:prstGeom prst="rect">
+            <a:avLst/>
+          </a:prstGeom>
+        </p:spPr>
+      </p:pic>
+      <p:pic>
+        <p:nvPicPr>
+          <p:cNvPr id="10" name="Picture 9">
+            <a:extLst>
+              <a:ext uri="{FF2B5EF4-FFF2-40B4-BE49-F238E27FC236}">
+                <a16:creationId xmlns:a16="http://schemas.microsoft.com/office/drawing/2014/main" id="{B99E4D65-4518-4BF3-C82A-A383E9352CFD}"/>
+              </a:ext>
+            </a:extLst>
+          </p:cNvPr>
+          <p:cNvPicPr>
+            <a:picLocks noChangeAspect="1"/>
+          </p:cNvPicPr>
+          <p:nvPr/>
+        </p:nvPicPr>
+        <p:blipFill>
+          <a:blip r:embed="rId5"/>
+          <a:stretch>
+            <a:fillRect/>
+          </a:stretch>
+        </p:blipFill>
+        <p:spPr>
+          <a:xfrm>
+            <a:off x="7879595" y="2428735"/>
+            <a:ext cx="3057952" cy="3867690"/>
+          </a:xfrm>
+          <a:prstGeom prst="rect">
+            <a:avLst/>
+          </a:prstGeom>
+        </p:spPr>
+      </p:pic>
+      <p:sp>
+        <p:nvSpPr>
+          <p:cNvPr id="11" name="Oval 10">
+            <a:extLst>
+              <a:ext uri="{FF2B5EF4-FFF2-40B4-BE49-F238E27FC236}">
+                <a16:creationId xmlns:a16="http://schemas.microsoft.com/office/drawing/2014/main" id="{2AC182CA-0D38-078A-2721-7391D325AE90}"/>
+              </a:ext>
+            </a:extLst>
+          </p:cNvPr>
+          <p:cNvSpPr/>
+          <p:nvPr/>
+        </p:nvSpPr>
+        <p:spPr>
+          <a:xfrm>
+            <a:off x="6548838" y="4563291"/>
+            <a:ext cx="415319" cy="407133"/>
+          </a:xfrm>
+          <a:prstGeom prst="ellipse">
+            <a:avLst/>
+          </a:prstGeom>
+          <a:noFill/>
+          <a:ln w="47625">
+            <a:solidFill>
+              <a:schemeClr val="accent2"/>
+            </a:solidFill>
+          </a:ln>
+        </p:spPr>
+        <p:style>
+          <a:lnRef idx="2">
+            <a:schemeClr val="accent1">
+              <a:shade val="15000"/>
+            </a:schemeClr>
+          </a:lnRef>
+          <a:fillRef idx="1">
+            <a:schemeClr val="accent1"/>
+          </a:fillRef>
+          <a:effectRef idx="0">
+            <a:schemeClr val="accent1"/>
+          </a:effectRef>
+          <a:fontRef idx="minor">
+            <a:schemeClr val="lt1"/>
+          </a:fontRef>
+        </p:style>
+        <p:txBody>
+          <a:bodyPr rtlCol="0" anchor="ctr"/>
+          <a:lstStyle/>
+          <a:p>
+            <a:pPr algn="ctr"/>
+            <a:endParaRPr lang="en-CA"/>
+          </a:p>
+        </p:txBody>
+      </p:sp>
+    </p:spTree>
+    <p:extLst>
+      <p:ext uri="{BB962C8B-B14F-4D97-AF65-F5344CB8AC3E}">
+        <p14:creationId xmlns:p14="http://schemas.microsoft.com/office/powerpoint/2010/main" val="1971749385"/>
+      </p:ext>
+    </p:extLst>
+  </p:cSld>
+  <p:clrMapOvr>
+    <a:masterClrMapping/>
+  </p:clrMapOvr>
+</p:sld>
+</file>
+
+<file path=ppt/slides/slide7.xml><?xml version="1.0" encoding="utf-8"?>
+<p:sld xmlns:a="http://schemas.openxmlformats.org/drawingml/2006/main" xmlns:r="http://schemas.openxmlformats.org/officeDocument/2006/relationships" xmlns:p="http://schemas.openxmlformats.org/presentationml/2006/main">
+  <p:cSld>
+    <p:spTree>
+      <p:nvGrpSpPr>
+        <p:cNvPr id="1" name=""/>
+        <p:cNvGrpSpPr/>
+        <p:nvPr/>
+      </p:nvGrpSpPr>
+      <p:grpSpPr>
+        <a:xfrm>
+          <a:off x="0" y="0"/>
+          <a:ext cx="0" cy="0"/>
+          <a:chOff x="0" y="0"/>
+          <a:chExt cx="0" cy="0"/>
+        </a:xfrm>
+      </p:grpSpPr>
+      <p:pic>
+        <p:nvPicPr>
+          <p:cNvPr id="7" name="Picture 6">
+            <a:extLst>
+              <a:ext uri="{FF2B5EF4-FFF2-40B4-BE49-F238E27FC236}">
+                <a16:creationId xmlns:a16="http://schemas.microsoft.com/office/drawing/2014/main" id="{FA0A3DF9-3102-A39F-0231-DC16847D5599}"/>
+              </a:ext>
+            </a:extLst>
+          </p:cNvPr>
+          <p:cNvPicPr>
+            <a:picLocks noChangeAspect="1"/>
+          </p:cNvPicPr>
+          <p:nvPr/>
+        </p:nvPicPr>
+        <p:blipFill>
+          <a:blip r:embed="rId2"/>
+          <a:stretch>
+            <a:fillRect/>
+          </a:stretch>
+        </p:blipFill>
+        <p:spPr>
+          <a:xfrm>
+            <a:off x="5594835" y="483584"/>
+            <a:ext cx="4067743" cy="6030167"/>
+          </a:xfrm>
+          <a:prstGeom prst="rect">
+            <a:avLst/>
+          </a:prstGeom>
+        </p:spPr>
+      </p:pic>
+      <p:pic>
+        <p:nvPicPr>
+          <p:cNvPr id="5" name="Picture 4">
+            <a:extLst>
+              <a:ext uri="{FF2B5EF4-FFF2-40B4-BE49-F238E27FC236}">
+                <a16:creationId xmlns:a16="http://schemas.microsoft.com/office/drawing/2014/main" id="{4FAB4981-2B83-DC15-A76B-18B0AF25589C}"/>
+              </a:ext>
+            </a:extLst>
+          </p:cNvPr>
+          <p:cNvPicPr>
+            <a:picLocks noChangeAspect="1"/>
+          </p:cNvPicPr>
+          <p:nvPr/>
+        </p:nvPicPr>
+        <p:blipFill>
+          <a:blip r:embed="rId3"/>
+          <a:stretch>
+            <a:fillRect/>
+          </a:stretch>
+        </p:blipFill>
+        <p:spPr>
+          <a:xfrm>
+            <a:off x="1406013" y="483584"/>
+            <a:ext cx="4067743" cy="6030167"/>
+          </a:xfrm>
+          <a:prstGeom prst="rect">
+            <a:avLst/>
+          </a:prstGeom>
+        </p:spPr>
+      </p:pic>
+    </p:spTree>
+    <p:extLst>
+      <p:ext uri="{BB962C8B-B14F-4D97-AF65-F5344CB8AC3E}">
+        <p14:creationId xmlns:p14="http://schemas.microsoft.com/office/powerpoint/2010/main" val="3040248324"/>
+      </p:ext>
+    </p:extLst>
+  </p:cSld>
+  <p:clrMapOvr>
+    <a:masterClrMapping/>
+  </p:clrMapOvr>
+</p:sld>
+</file>
+
+<file path=ppt/slides/slide8.xml><?xml version="1.0" encoding="utf-8"?>
+<p:sld xmlns:a="http://schemas.openxmlformats.org/drawingml/2006/main" xmlns:r="http://schemas.openxmlformats.org/officeDocument/2006/relationships" xmlns:p="http://schemas.openxmlformats.org/presentationml/2006/main">
+  <p:cSld>
+    <p:spTree>
+      <p:nvGrpSpPr>
+        <p:cNvPr id="1" name=""/>
+        <p:cNvGrpSpPr/>
+        <p:nvPr/>
+      </p:nvGrpSpPr>
+      <p:grpSpPr>
+        <a:xfrm>
+          <a:off x="0" y="0"/>
+          <a:ext cx="0" cy="0"/>
+          <a:chOff x="0" y="0"/>
+          <a:chExt cx="0" cy="0"/>
+        </a:xfrm>
+      </p:grpSpPr>
+      <p:pic>
+        <p:nvPicPr>
+          <p:cNvPr id="3" name="Picture 2">
+            <a:extLst>
+              <a:ext uri="{FF2B5EF4-FFF2-40B4-BE49-F238E27FC236}">
+                <a16:creationId xmlns:a16="http://schemas.microsoft.com/office/drawing/2014/main" id="{D10265D8-546B-B48C-4513-CEDC6A304F44}"/>
+              </a:ext>
+            </a:extLst>
+          </p:cNvPr>
+          <p:cNvPicPr>
+            <a:picLocks noChangeAspect="1"/>
+          </p:cNvPicPr>
+          <p:nvPr/>
+        </p:nvPicPr>
+        <p:blipFill>
+          <a:blip r:embed="rId2"/>
+          <a:stretch>
+            <a:fillRect/>
+          </a:stretch>
+        </p:blipFill>
+        <p:spPr>
+          <a:xfrm>
+            <a:off x="0" y="0"/>
+            <a:ext cx="12192000" cy="6858000"/>
+          </a:xfrm>
+          <a:prstGeom prst="rect">
+            <a:avLst/>
+          </a:prstGeom>
+        </p:spPr>
+      </p:pic>
+    </p:spTree>
+    <p:extLst>
+      <p:ext uri="{BB962C8B-B14F-4D97-AF65-F5344CB8AC3E}">
+        <p14:creationId xmlns:p14="http://schemas.microsoft.com/office/powerpoint/2010/main" val="425162536"/>
+      </p:ext>
+    </p:extLst>
+  </p:cSld>
+  <p:clrMapOvr>
+    <a:masterClrMapping/>
+  </p:clrMapOvr>
+</p:sld>
+</file>
+
+<file path=ppt/slides/slide9.xml><?xml version="1.0" encoding="utf-8"?>
+<p:sld xmlns:a="http://schemas.openxmlformats.org/drawingml/2006/main" xmlns:r="http://schemas.openxmlformats.org/officeDocument/2006/relationships" xmlns:p="http://schemas.openxmlformats.org/presentationml/2006/main">
+  <p:cSld>
+    <p:spTree>
+      <p:nvGrpSpPr>
+        <p:cNvPr id="1" name=""/>
+        <p:cNvGrpSpPr/>
+        <p:nvPr/>
+      </p:nvGrpSpPr>
+      <p:grpSpPr>
+        <a:xfrm>
+          <a:off x="0" y="0"/>
+          <a:ext cx="0" cy="0"/>
+          <a:chOff x="0" y="0"/>
+          <a:chExt cx="0" cy="0"/>
+        </a:xfrm>
+      </p:grpSpPr>
+      <p:pic>
+        <p:nvPicPr>
+          <p:cNvPr id="3" name="Picture 2">
+            <a:extLst>
+              <a:ext uri="{FF2B5EF4-FFF2-40B4-BE49-F238E27FC236}">
+                <a16:creationId xmlns:a16="http://schemas.microsoft.com/office/drawing/2014/main" id="{AC366801-B950-FAEC-1AD9-6F022A23CF6C}"/>
+              </a:ext>
+            </a:extLst>
+          </p:cNvPr>
+          <p:cNvPicPr>
+            <a:picLocks noChangeAspect="1"/>
+          </p:cNvPicPr>
+          <p:nvPr/>
+        </p:nvPicPr>
+        <p:blipFill>
+          <a:blip r:embed="rId2"/>
+          <a:stretch>
+            <a:fillRect/>
+          </a:stretch>
+        </p:blipFill>
+        <p:spPr>
+          <a:xfrm>
+            <a:off x="1097280" y="764480"/>
+            <a:ext cx="2939337" cy="3987274"/>
+          </a:xfrm>
+          <a:prstGeom prst="rect">
+            <a:avLst/>
+          </a:prstGeom>
+        </p:spPr>
+      </p:pic>
+      <p:pic>
+        <p:nvPicPr>
+          <p:cNvPr id="5" name="Picture 4">
+            <a:extLst>
+              <a:ext uri="{FF2B5EF4-FFF2-40B4-BE49-F238E27FC236}">
+                <a16:creationId xmlns:a16="http://schemas.microsoft.com/office/drawing/2014/main" id="{D33BA401-92F6-000F-C408-628322DDE511}"/>
+              </a:ext>
+            </a:extLst>
+          </p:cNvPr>
+          <p:cNvPicPr>
+            <a:picLocks noChangeAspect="1"/>
+          </p:cNvPicPr>
+          <p:nvPr/>
+        </p:nvPicPr>
+        <p:blipFill>
+          <a:blip r:embed="rId3"/>
+          <a:stretch>
+            <a:fillRect/>
+          </a:stretch>
+        </p:blipFill>
+        <p:spPr>
+          <a:xfrm>
+            <a:off x="4356564" y="817379"/>
+            <a:ext cx="2381582" cy="3934374"/>
+          </a:xfrm>
+          <a:prstGeom prst="rect">
+            <a:avLst/>
+          </a:prstGeom>
+        </p:spPr>
+      </p:pic>
+      <p:pic>
+        <p:nvPicPr>
+          <p:cNvPr id="7" name="Picture 6">
+            <a:extLst>
+              <a:ext uri="{FF2B5EF4-FFF2-40B4-BE49-F238E27FC236}">
+                <a16:creationId xmlns:a16="http://schemas.microsoft.com/office/drawing/2014/main" id="{BFBBDCF2-9B56-0454-A4D1-EB46455E8F12}"/>
+              </a:ext>
+            </a:extLst>
+          </p:cNvPr>
+          <p:cNvPicPr>
+            <a:picLocks noChangeAspect="1"/>
+          </p:cNvPicPr>
+          <p:nvPr/>
+        </p:nvPicPr>
+        <p:blipFill>
+          <a:blip r:embed="rId4"/>
+          <a:stretch>
+            <a:fillRect/>
+          </a:stretch>
+        </p:blipFill>
+        <p:spPr>
+          <a:xfrm>
+            <a:off x="6943015" y="817379"/>
+            <a:ext cx="2381582" cy="3934374"/>
+          </a:xfrm>
+          <a:prstGeom prst="rect">
+            <a:avLst/>
+          </a:prstGeom>
+        </p:spPr>
+      </p:pic>
+      <p:sp>
+        <p:nvSpPr>
+          <p:cNvPr id="8" name="Oval 7">
+            <a:extLst>
+              <a:ext uri="{FF2B5EF4-FFF2-40B4-BE49-F238E27FC236}">
+                <a16:creationId xmlns:a16="http://schemas.microsoft.com/office/drawing/2014/main" id="{88ABD62E-B9FF-7927-408A-50059A3B423E}"/>
+              </a:ext>
+            </a:extLst>
+          </p:cNvPr>
+          <p:cNvSpPr/>
+          <p:nvPr/>
+        </p:nvSpPr>
+        <p:spPr>
+          <a:xfrm>
+            <a:off x="2867403" y="3805646"/>
+            <a:ext cx="1060163" cy="333117"/>
+          </a:xfrm>
+          <a:prstGeom prst="ellipse">
+            <a:avLst/>
+          </a:prstGeom>
+          <a:noFill/>
+          <a:ln w="47625">
+            <a:solidFill>
+              <a:schemeClr val="accent2"/>
+            </a:solidFill>
+          </a:ln>
+        </p:spPr>
+        <p:style>
+          <a:lnRef idx="2">
+            <a:schemeClr val="accent1">
+              <a:shade val="15000"/>
+            </a:schemeClr>
+          </a:lnRef>
+          <a:fillRef idx="1">
+            <a:schemeClr val="accent1"/>
+          </a:fillRef>
+          <a:effectRef idx="0">
+            <a:schemeClr val="accent1"/>
+          </a:effectRef>
+          <a:fontRef idx="minor">
+            <a:schemeClr val="lt1"/>
+          </a:fontRef>
+        </p:style>
+        <p:txBody>
+          <a:bodyPr rtlCol="0" anchor="ctr"/>
+          <a:lstStyle/>
+          <a:p>
+            <a:pPr algn="ctr"/>
+            <a:endParaRPr lang="en-CA"/>
+          </a:p>
+        </p:txBody>
+      </p:sp>
+    </p:spTree>
+    <p:extLst>
+      <p:ext uri="{BB962C8B-B14F-4D97-AF65-F5344CB8AC3E}">
+        <p14:creationId xmlns:p14="http://schemas.microsoft.com/office/powerpoint/2010/main" val="2730015793"/>
+      </p:ext>
+    </p:extLst>
+  </p:cSld>
+  <p:clrMapOvr>
+    <a:masterClrMapping/>
+  </p:clrMapOvr>
+</p:sld>
+</file>
+
 <file path=ppt/theme/theme1.xml><?xml version="1.0" encoding="utf-8"?>
 <a:theme xmlns:a="http://schemas.openxmlformats.org/drawingml/2006/main" name="Office Theme">
   <a:themeElements>

</xml_diff>